<commit_message>
#79 design boarding pass background.
</commit_message>
<xml_diff>
--- a/kiosk/icons/reserve/seatIcons.pptx
+++ b/kiosk/icons/reserve/seatIcons.pptx
@@ -6,6 +6,8 @@
   </p:sldMasterIdLst>
   <p:sldIdLst>
     <p:sldId id="256" r:id="rId2"/>
+    <p:sldId id="257" r:id="rId3"/>
+    <p:sldId id="258" r:id="rId4"/>
   </p:sldIdLst>
   <p:sldSz cx="12192000" cy="6858000"/>
   <p:notesSz cx="6858000" cy="9144000"/>
@@ -259,7 +261,7 @@
           <a:p>
             <a:fld id="{C53F72F5-EC46-4A9F-BAA9-6D34191D1B77}" type="datetimeFigureOut">
               <a:rPr lang="zh-CN" altLang="en-US" smtClean="0"/>
-              <a:t>2022/4/21</a:t>
+              <a:t>2022/5/19</a:t>
             </a:fld>
             <a:endParaRPr lang="zh-CN" altLang="en-US"/>
           </a:p>
@@ -457,7 +459,7 @@
           <a:p>
             <a:fld id="{C53F72F5-EC46-4A9F-BAA9-6D34191D1B77}" type="datetimeFigureOut">
               <a:rPr lang="zh-CN" altLang="en-US" smtClean="0"/>
-              <a:t>2022/4/21</a:t>
+              <a:t>2022/5/19</a:t>
             </a:fld>
             <a:endParaRPr lang="zh-CN" altLang="en-US"/>
           </a:p>
@@ -665,7 +667,7 @@
           <a:p>
             <a:fld id="{C53F72F5-EC46-4A9F-BAA9-6D34191D1B77}" type="datetimeFigureOut">
               <a:rPr lang="zh-CN" altLang="en-US" smtClean="0"/>
-              <a:t>2022/4/21</a:t>
+              <a:t>2022/5/19</a:t>
             </a:fld>
             <a:endParaRPr lang="zh-CN" altLang="en-US"/>
           </a:p>
@@ -863,7 +865,7 @@
           <a:p>
             <a:fld id="{C53F72F5-EC46-4A9F-BAA9-6D34191D1B77}" type="datetimeFigureOut">
               <a:rPr lang="zh-CN" altLang="en-US" smtClean="0"/>
-              <a:t>2022/4/21</a:t>
+              <a:t>2022/5/19</a:t>
             </a:fld>
             <a:endParaRPr lang="zh-CN" altLang="en-US"/>
           </a:p>
@@ -1138,7 +1140,7 @@
           <a:p>
             <a:fld id="{C53F72F5-EC46-4A9F-BAA9-6D34191D1B77}" type="datetimeFigureOut">
               <a:rPr lang="zh-CN" altLang="en-US" smtClean="0"/>
-              <a:t>2022/4/21</a:t>
+              <a:t>2022/5/19</a:t>
             </a:fld>
             <a:endParaRPr lang="zh-CN" altLang="en-US"/>
           </a:p>
@@ -1403,7 +1405,7 @@
           <a:p>
             <a:fld id="{C53F72F5-EC46-4A9F-BAA9-6D34191D1B77}" type="datetimeFigureOut">
               <a:rPr lang="zh-CN" altLang="en-US" smtClean="0"/>
-              <a:t>2022/4/21</a:t>
+              <a:t>2022/5/19</a:t>
             </a:fld>
             <a:endParaRPr lang="zh-CN" altLang="en-US"/>
           </a:p>
@@ -1815,7 +1817,7 @@
           <a:p>
             <a:fld id="{C53F72F5-EC46-4A9F-BAA9-6D34191D1B77}" type="datetimeFigureOut">
               <a:rPr lang="zh-CN" altLang="en-US" smtClean="0"/>
-              <a:t>2022/4/21</a:t>
+              <a:t>2022/5/19</a:t>
             </a:fld>
             <a:endParaRPr lang="zh-CN" altLang="en-US"/>
           </a:p>
@@ -1956,7 +1958,7 @@
           <a:p>
             <a:fld id="{C53F72F5-EC46-4A9F-BAA9-6D34191D1B77}" type="datetimeFigureOut">
               <a:rPr lang="zh-CN" altLang="en-US" smtClean="0"/>
-              <a:t>2022/4/21</a:t>
+              <a:t>2022/5/19</a:t>
             </a:fld>
             <a:endParaRPr lang="zh-CN" altLang="en-US"/>
           </a:p>
@@ -2069,7 +2071,7 @@
           <a:p>
             <a:fld id="{C53F72F5-EC46-4A9F-BAA9-6D34191D1B77}" type="datetimeFigureOut">
               <a:rPr lang="zh-CN" altLang="en-US" smtClean="0"/>
-              <a:t>2022/4/21</a:t>
+              <a:t>2022/5/19</a:t>
             </a:fld>
             <a:endParaRPr lang="zh-CN" altLang="en-US"/>
           </a:p>
@@ -2380,7 +2382,7 @@
           <a:p>
             <a:fld id="{C53F72F5-EC46-4A9F-BAA9-6D34191D1B77}" type="datetimeFigureOut">
               <a:rPr lang="zh-CN" altLang="en-US" smtClean="0"/>
-              <a:t>2022/4/21</a:t>
+              <a:t>2022/5/19</a:t>
             </a:fld>
             <a:endParaRPr lang="zh-CN" altLang="en-US"/>
           </a:p>
@@ -2668,7 +2670,7 @@
           <a:p>
             <a:fld id="{C53F72F5-EC46-4A9F-BAA9-6D34191D1B77}" type="datetimeFigureOut">
               <a:rPr lang="zh-CN" altLang="en-US" smtClean="0"/>
-              <a:t>2022/4/21</a:t>
+              <a:t>2022/5/19</a:t>
             </a:fld>
             <a:endParaRPr lang="zh-CN" altLang="en-US"/>
           </a:p>
@@ -2909,7 +2911,7 @@
           <a:p>
             <a:fld id="{C53F72F5-EC46-4A9F-BAA9-6D34191D1B77}" type="datetimeFigureOut">
               <a:rPr lang="zh-CN" altLang="en-US" smtClean="0"/>
-              <a:t>2022/4/21</a:t>
+              <a:t>2022/5/19</a:t>
             </a:fld>
             <a:endParaRPr lang="zh-CN" altLang="en-US"/>
           </a:p>
@@ -3986,6 +3988,3453 @@
 </p:sld>
 </file>
 
+<file path=ppt/slides/slide2.xml><?xml version="1.0" encoding="utf-8"?>
+<p:sld xmlns:a="http://schemas.openxmlformats.org/drawingml/2006/main" xmlns:r="http://schemas.openxmlformats.org/officeDocument/2006/relationships" xmlns:p="http://schemas.openxmlformats.org/presentationml/2006/main">
+  <p:cSld>
+    <p:bg>
+      <p:bgPr>
+        <a:solidFill>
+          <a:schemeClr val="tx1">
+            <a:lumMod val="95000"/>
+            <a:lumOff val="5000"/>
+          </a:schemeClr>
+        </a:solidFill>
+        <a:effectLst/>
+      </p:bgPr>
+    </p:bg>
+    <p:spTree>
+      <p:nvGrpSpPr>
+        <p:cNvPr id="1" name=""/>
+        <p:cNvGrpSpPr/>
+        <p:nvPr/>
+      </p:nvGrpSpPr>
+      <p:grpSpPr>
+        <a:xfrm>
+          <a:off x="0" y="0"/>
+          <a:ext cx="0" cy="0"/>
+          <a:chOff x="0" y="0"/>
+          <a:chExt cx="0" cy="0"/>
+        </a:xfrm>
+      </p:grpSpPr>
+      <p:pic>
+        <p:nvPicPr>
+          <p:cNvPr id="6" name="图片 5" descr="图示&#10;&#10;低可信度描述已自动生成">
+            <a:extLst>
+              <a:ext uri="{FF2B5EF4-FFF2-40B4-BE49-F238E27FC236}">
+                <a16:creationId xmlns:a16="http://schemas.microsoft.com/office/drawing/2014/main" id="{9AA561A5-E291-A813-E64A-8C880098515D}"/>
+              </a:ext>
+            </a:extLst>
+          </p:cNvPr>
+          <p:cNvPicPr>
+            <a:picLocks noChangeAspect="1"/>
+          </p:cNvPicPr>
+          <p:nvPr/>
+        </p:nvPicPr>
+        <p:blipFill rotWithShape="1">
+          <a:blip r:embed="rId2">
+            <a:extLst>
+              <a:ext uri="{28A0092B-C50C-407E-A947-70E740481C1C}">
+                <a14:useLocalDpi xmlns:a14="http://schemas.microsoft.com/office/drawing/2010/main" val="0"/>
+              </a:ext>
+            </a:extLst>
+          </a:blip>
+          <a:srcRect l="259" t="1301" r="163" b="541"/>
+          <a:stretch/>
+        </p:blipFill>
+        <p:spPr>
+          <a:xfrm>
+            <a:off x="704597" y="3454171"/>
+            <a:ext cx="10375804" cy="2779233"/>
+          </a:xfrm>
+          <a:prstGeom prst="rect">
+            <a:avLst/>
+          </a:prstGeom>
+        </p:spPr>
+      </p:pic>
+      <p:grpSp>
+        <p:nvGrpSpPr>
+          <p:cNvPr id="15" name="组合 14">
+            <a:extLst>
+              <a:ext uri="{FF2B5EF4-FFF2-40B4-BE49-F238E27FC236}">
+                <a16:creationId xmlns:a16="http://schemas.microsoft.com/office/drawing/2014/main" id="{01E231AF-2C56-F386-5FC8-2FB4B31E1543}"/>
+              </a:ext>
+            </a:extLst>
+          </p:cNvPr>
+          <p:cNvGrpSpPr/>
+          <p:nvPr/>
+        </p:nvGrpSpPr>
+        <p:grpSpPr>
+          <a:xfrm>
+            <a:off x="704597" y="401992"/>
+            <a:ext cx="10412887" cy="2803862"/>
+            <a:chOff x="704597" y="401992"/>
+            <a:chExt cx="10412887" cy="2803862"/>
+          </a:xfrm>
+        </p:grpSpPr>
+        <p:grpSp>
+          <p:nvGrpSpPr>
+            <p:cNvPr id="9" name="组合 8">
+              <a:extLst>
+                <a:ext uri="{FF2B5EF4-FFF2-40B4-BE49-F238E27FC236}">
+                  <a16:creationId xmlns:a16="http://schemas.microsoft.com/office/drawing/2014/main" id="{83E73258-7210-33A4-6CC3-7C5D73379845}"/>
+                </a:ext>
+              </a:extLst>
+            </p:cNvPr>
+            <p:cNvGrpSpPr/>
+            <p:nvPr/>
+          </p:nvGrpSpPr>
+          <p:grpSpPr>
+            <a:xfrm>
+              <a:off x="704597" y="401992"/>
+              <a:ext cx="10412887" cy="2803862"/>
+              <a:chOff x="704597" y="401992"/>
+              <a:chExt cx="10412887" cy="2803862"/>
+            </a:xfrm>
+          </p:grpSpPr>
+          <p:sp>
+            <p:nvSpPr>
+              <p:cNvPr id="4" name="矩形: 圆角 3">
+                <a:extLst>
+                  <a:ext uri="{FF2B5EF4-FFF2-40B4-BE49-F238E27FC236}">
+                    <a16:creationId xmlns:a16="http://schemas.microsoft.com/office/drawing/2014/main" id="{A8CA2ADD-6D7D-8C0B-C138-F92D277447CC}"/>
+                  </a:ext>
+                </a:extLst>
+              </p:cNvPr>
+              <p:cNvSpPr>
+                <a:spLocks noChangeAspect="1"/>
+              </p:cNvSpPr>
+              <p:nvPr/>
+            </p:nvSpPr>
+            <p:spPr>
+              <a:xfrm>
+                <a:off x="704597" y="416688"/>
+                <a:ext cx="10412887" cy="2789166"/>
+              </a:xfrm>
+              <a:prstGeom prst="roundRect">
+                <a:avLst>
+                  <a:gd name="adj" fmla="val 8289"/>
+                </a:avLst>
+              </a:prstGeom>
+              <a:solidFill>
+                <a:srgbClr val="C03030"/>
+              </a:solidFill>
+              <a:ln>
+                <a:noFill/>
+              </a:ln>
+            </p:spPr>
+            <p:style>
+              <a:lnRef idx="2">
+                <a:schemeClr val="accent1">
+                  <a:shade val="50000"/>
+                </a:schemeClr>
+              </a:lnRef>
+              <a:fillRef idx="1">
+                <a:schemeClr val="accent1"/>
+              </a:fillRef>
+              <a:effectRef idx="0">
+                <a:schemeClr val="accent1"/>
+              </a:effectRef>
+              <a:fontRef idx="minor">
+                <a:schemeClr val="lt1"/>
+              </a:fontRef>
+            </p:style>
+            <p:txBody>
+              <a:bodyPr rtlCol="0" anchor="ctr"/>
+              <a:lstStyle/>
+              <a:p>
+                <a:pPr algn="ctr"/>
+                <a:endParaRPr lang="zh-CN" altLang="en-US" baseline="-25000" dirty="0">
+                  <a:noFill/>
+                </a:endParaRPr>
+              </a:p>
+            </p:txBody>
+          </p:sp>
+          <p:sp>
+            <p:nvSpPr>
+              <p:cNvPr id="7" name="矩形: 圆角 6">
+                <a:extLst>
+                  <a:ext uri="{FF2B5EF4-FFF2-40B4-BE49-F238E27FC236}">
+                    <a16:creationId xmlns:a16="http://schemas.microsoft.com/office/drawing/2014/main" id="{58CB71FB-59CC-0030-F7BD-42A05E311CEF}"/>
+                  </a:ext>
+                </a:extLst>
+              </p:cNvPr>
+              <p:cNvSpPr>
+                <a:spLocks noChangeAspect="1"/>
+              </p:cNvSpPr>
+              <p:nvPr/>
+            </p:nvSpPr>
+            <p:spPr>
+              <a:xfrm>
+                <a:off x="704597" y="852676"/>
+                <a:ext cx="10412886" cy="2353178"/>
+              </a:xfrm>
+              <a:prstGeom prst="roundRect">
+                <a:avLst>
+                  <a:gd name="adj" fmla="val 8289"/>
+                </a:avLst>
+              </a:prstGeom>
+              <a:solidFill>
+                <a:schemeClr val="bg1"/>
+              </a:solidFill>
+              <a:ln>
+                <a:noFill/>
+              </a:ln>
+              <a:effectLst>
+                <a:outerShdw blurRad="50800" dist="63500" dir="16200000" rotWithShape="0">
+                  <a:prstClr val="black">
+                    <a:alpha val="15000"/>
+                  </a:prstClr>
+                </a:outerShdw>
+              </a:effectLst>
+            </p:spPr>
+            <p:style>
+              <a:lnRef idx="2">
+                <a:schemeClr val="accent1">
+                  <a:shade val="50000"/>
+                </a:schemeClr>
+              </a:lnRef>
+              <a:fillRef idx="1">
+                <a:schemeClr val="accent1"/>
+              </a:fillRef>
+              <a:effectRef idx="0">
+                <a:schemeClr val="accent1"/>
+              </a:effectRef>
+              <a:fontRef idx="minor">
+                <a:schemeClr val="lt1"/>
+              </a:fontRef>
+            </p:style>
+            <p:txBody>
+              <a:bodyPr rtlCol="0" anchor="ctr"/>
+              <a:lstStyle/>
+              <a:p>
+                <a:pPr algn="ctr"/>
+                <a:endParaRPr lang="zh-CN" altLang="en-US" baseline="-25000" dirty="0">
+                  <a:noFill/>
+                </a:endParaRPr>
+              </a:p>
+            </p:txBody>
+          </p:sp>
+          <p:sp>
+            <p:nvSpPr>
+              <p:cNvPr id="8" name="文本框 7">
+                <a:extLst>
+                  <a:ext uri="{FF2B5EF4-FFF2-40B4-BE49-F238E27FC236}">
+                    <a16:creationId xmlns:a16="http://schemas.microsoft.com/office/drawing/2014/main" id="{7496C451-1A5D-3E6C-7E72-C0DBA4ED1692}"/>
+                  </a:ext>
+                </a:extLst>
+              </p:cNvPr>
+              <p:cNvSpPr txBox="1"/>
+              <p:nvPr/>
+            </p:nvSpPr>
+            <p:spPr>
+              <a:xfrm>
+                <a:off x="1066379" y="401992"/>
+                <a:ext cx="1993803" cy="338554"/>
+              </a:xfrm>
+              <a:prstGeom prst="rect">
+                <a:avLst/>
+              </a:prstGeom>
+              <a:noFill/>
+            </p:spPr>
+            <p:txBody>
+              <a:bodyPr wrap="square" rtlCol="0">
+                <a:spAutoFit/>
+              </a:bodyPr>
+              <a:lstStyle/>
+              <a:p>
+                <a:r>
+                  <a:rPr lang="en-US" altLang="zh-CN" sz="2400" baseline="-25000" dirty="0">
+                    <a:solidFill>
+                      <a:schemeClr val="bg1"/>
+                    </a:solidFill>
+                    <a:latin typeface="Arial" panose="020B0604020202020204" pitchFamily="34" charset="0"/>
+                    <a:cs typeface="Arial" panose="020B0604020202020204" pitchFamily="34" charset="0"/>
+                  </a:rPr>
+                  <a:t>BOARDING PASS</a:t>
+                </a:r>
+                <a:endParaRPr lang="zh-CN" altLang="en-US" sz="2400" baseline="-25000" dirty="0">
+                  <a:solidFill>
+                    <a:schemeClr val="bg1"/>
+                  </a:solidFill>
+                  <a:latin typeface="Arial" panose="020B0604020202020204" pitchFamily="34" charset="0"/>
+                  <a:cs typeface="Arial" panose="020B0604020202020204" pitchFamily="34" charset="0"/>
+                </a:endParaRPr>
+              </a:p>
+            </p:txBody>
+          </p:sp>
+        </p:grpSp>
+        <p:cxnSp>
+          <p:nvCxnSpPr>
+            <p:cNvPr id="11" name="直接连接符 10">
+              <a:extLst>
+                <a:ext uri="{FF2B5EF4-FFF2-40B4-BE49-F238E27FC236}">
+                  <a16:creationId xmlns:a16="http://schemas.microsoft.com/office/drawing/2014/main" id="{BD9AE80C-2AFD-8390-1EAA-C4E5494E8F19}"/>
+                </a:ext>
+              </a:extLst>
+            </p:cNvPr>
+            <p:cNvCxnSpPr>
+              <a:cxnSpLocks/>
+            </p:cNvCxnSpPr>
+            <p:nvPr/>
+          </p:nvCxnSpPr>
+          <p:spPr>
+            <a:xfrm flipV="1">
+              <a:off x="8337550" y="406528"/>
+              <a:ext cx="0" cy="2748143"/>
+            </a:xfrm>
+            <a:prstGeom prst="line">
+              <a:avLst/>
+            </a:prstGeom>
+            <a:ln w="28575" cap="rnd" cmpd="sng" algn="ctr">
+              <a:solidFill>
+                <a:schemeClr val="bg1">
+                  <a:lumMod val="85000"/>
+                  <a:alpha val="60000"/>
+                </a:schemeClr>
+              </a:solidFill>
+              <a:prstDash val="dash"/>
+              <a:round/>
+              <a:headEnd type="none" w="med" len="med"/>
+              <a:tailEnd type="none" w="med" len="med"/>
+            </a:ln>
+          </p:spPr>
+          <p:style>
+            <a:lnRef idx="0">
+              <a:scrgbClr r="0" g="0" b="0"/>
+            </a:lnRef>
+            <a:fillRef idx="0">
+              <a:scrgbClr r="0" g="0" b="0"/>
+            </a:fillRef>
+            <a:effectRef idx="0">
+              <a:scrgbClr r="0" g="0" b="0"/>
+            </a:effectRef>
+            <a:fontRef idx="minor">
+              <a:schemeClr val="tx1"/>
+            </a:fontRef>
+          </p:style>
+        </p:cxnSp>
+      </p:grpSp>
+      <p:sp>
+        <p:nvSpPr>
+          <p:cNvPr id="16" name="文本框 15">
+            <a:extLst>
+              <a:ext uri="{FF2B5EF4-FFF2-40B4-BE49-F238E27FC236}">
+                <a16:creationId xmlns:a16="http://schemas.microsoft.com/office/drawing/2014/main" id="{103C8B07-2465-F6A9-DE64-B1152898096E}"/>
+              </a:ext>
+            </a:extLst>
+          </p:cNvPr>
+          <p:cNvSpPr txBox="1"/>
+          <p:nvPr/>
+        </p:nvSpPr>
+        <p:spPr>
+          <a:xfrm>
+            <a:off x="1066380" y="1263821"/>
+            <a:ext cx="613265" cy="276999"/>
+          </a:xfrm>
+          <a:prstGeom prst="rect">
+            <a:avLst/>
+          </a:prstGeom>
+          <a:noFill/>
+        </p:spPr>
+        <p:txBody>
+          <a:bodyPr wrap="square" rtlCol="0">
+            <a:spAutoFit/>
+          </a:bodyPr>
+          <a:lstStyle/>
+          <a:p>
+            <a:r>
+              <a:rPr lang="en-US" altLang="zh-CN" sz="1200" dirty="0">
+                <a:solidFill>
+                  <a:srgbClr val="404040"/>
+                </a:solidFill>
+                <a:latin typeface="Arial" panose="020B0604020202020204" pitchFamily="34" charset="0"/>
+                <a:cs typeface="Arial" panose="020B0604020202020204" pitchFamily="34" charset="0"/>
+              </a:rPr>
+              <a:t>from</a:t>
+            </a:r>
+            <a:endParaRPr lang="zh-CN" altLang="en-US" sz="1200" dirty="0">
+              <a:solidFill>
+                <a:srgbClr val="404040"/>
+              </a:solidFill>
+              <a:latin typeface="Arial" panose="020B0604020202020204" pitchFamily="34" charset="0"/>
+              <a:cs typeface="Arial" panose="020B0604020202020204" pitchFamily="34" charset="0"/>
+            </a:endParaRPr>
+          </a:p>
+        </p:txBody>
+      </p:sp>
+      <p:sp>
+        <p:nvSpPr>
+          <p:cNvPr id="17" name="文本框 16">
+            <a:extLst>
+              <a:ext uri="{FF2B5EF4-FFF2-40B4-BE49-F238E27FC236}">
+                <a16:creationId xmlns:a16="http://schemas.microsoft.com/office/drawing/2014/main" id="{0425DF65-6715-7A11-1A03-84323E8F6042}"/>
+              </a:ext>
+            </a:extLst>
+          </p:cNvPr>
+          <p:cNvSpPr txBox="1"/>
+          <p:nvPr/>
+        </p:nvSpPr>
+        <p:spPr>
+          <a:xfrm>
+            <a:off x="3329827" y="1263821"/>
+            <a:ext cx="396240" cy="276999"/>
+          </a:xfrm>
+          <a:prstGeom prst="rect">
+            <a:avLst/>
+          </a:prstGeom>
+          <a:noFill/>
+        </p:spPr>
+        <p:txBody>
+          <a:bodyPr wrap="square" rtlCol="0">
+            <a:spAutoFit/>
+          </a:bodyPr>
+          <a:lstStyle/>
+          <a:p>
+            <a:r>
+              <a:rPr lang="en-US" altLang="zh-CN" sz="1200" dirty="0">
+                <a:solidFill>
+                  <a:srgbClr val="404040"/>
+                </a:solidFill>
+                <a:latin typeface="Arial" panose="020B0604020202020204" pitchFamily="34" charset="0"/>
+                <a:cs typeface="Arial" panose="020B0604020202020204" pitchFamily="34" charset="0"/>
+              </a:rPr>
+              <a:t>to</a:t>
+            </a:r>
+            <a:endParaRPr lang="zh-CN" altLang="en-US" sz="1200" dirty="0">
+              <a:solidFill>
+                <a:srgbClr val="404040"/>
+              </a:solidFill>
+              <a:latin typeface="Arial" panose="020B0604020202020204" pitchFamily="34" charset="0"/>
+              <a:cs typeface="Arial" panose="020B0604020202020204" pitchFamily="34" charset="0"/>
+            </a:endParaRPr>
+          </a:p>
+        </p:txBody>
+      </p:sp>
+      <p:pic>
+        <p:nvPicPr>
+          <p:cNvPr id="23" name="图片 22" descr="形状, 箭头&#10;&#10;描述已自动生成">
+            <a:extLst>
+              <a:ext uri="{FF2B5EF4-FFF2-40B4-BE49-F238E27FC236}">
+                <a16:creationId xmlns:a16="http://schemas.microsoft.com/office/drawing/2014/main" id="{38C42508-6C38-437F-01B5-77BC10FC45C2}"/>
+              </a:ext>
+            </a:extLst>
+          </p:cNvPr>
+          <p:cNvPicPr>
+            <a:picLocks noChangeAspect="1"/>
+          </p:cNvPicPr>
+          <p:nvPr/>
+        </p:nvPicPr>
+        <p:blipFill>
+          <a:blip r:embed="rId3">
+            <a:extLst>
+              <a:ext uri="{28A0092B-C50C-407E-A947-70E740481C1C}">
+                <a14:useLocalDpi xmlns:a14="http://schemas.microsoft.com/office/drawing/2010/main" val="0"/>
+              </a:ext>
+            </a:extLst>
+          </a:blip>
+          <a:stretch>
+            <a:fillRect/>
+          </a:stretch>
+        </p:blipFill>
+        <p:spPr>
+          <a:xfrm>
+            <a:off x="2557703" y="987381"/>
+            <a:ext cx="606840" cy="435569"/>
+          </a:xfrm>
+          <a:prstGeom prst="rect">
+            <a:avLst/>
+          </a:prstGeom>
+        </p:spPr>
+      </p:pic>
+      <p:sp>
+        <p:nvSpPr>
+          <p:cNvPr id="24" name="文本框 23">
+            <a:extLst>
+              <a:ext uri="{FF2B5EF4-FFF2-40B4-BE49-F238E27FC236}">
+                <a16:creationId xmlns:a16="http://schemas.microsoft.com/office/drawing/2014/main" id="{BCCD1A1F-6E16-C20D-7029-F7816C4F7761}"/>
+              </a:ext>
+            </a:extLst>
+          </p:cNvPr>
+          <p:cNvSpPr txBox="1"/>
+          <p:nvPr/>
+        </p:nvSpPr>
+        <p:spPr>
+          <a:xfrm>
+            <a:off x="1074516" y="1022840"/>
+            <a:ext cx="1336948" cy="400110"/>
+          </a:xfrm>
+          <a:prstGeom prst="rect">
+            <a:avLst/>
+          </a:prstGeom>
+          <a:noFill/>
+        </p:spPr>
+        <p:txBody>
+          <a:bodyPr wrap="square" rtlCol="0">
+            <a:spAutoFit/>
+          </a:bodyPr>
+          <a:lstStyle/>
+          <a:p>
+            <a:r>
+              <a:rPr lang="en-US" altLang="zh-CN" sz="2000" b="1" dirty="0">
+                <a:latin typeface="Arial" panose="020B0604020202020204" pitchFamily="34" charset="0"/>
+                <a:cs typeface="Arial" panose="020B0604020202020204" pitchFamily="34" charset="0"/>
+              </a:rPr>
+              <a:t>New</a:t>
+            </a:r>
+            <a:r>
+              <a:rPr lang="zh-CN" altLang="en-US" sz="2000" b="1" dirty="0">
+                <a:latin typeface="Arial" panose="020B0604020202020204" pitchFamily="34" charset="0"/>
+                <a:cs typeface="Arial" panose="020B0604020202020204" pitchFamily="34" charset="0"/>
+              </a:rPr>
+              <a:t> </a:t>
+            </a:r>
+            <a:r>
+              <a:rPr lang="en-US" altLang="zh-CN" sz="2000" b="1" dirty="0">
+                <a:latin typeface="Arial" panose="020B0604020202020204" pitchFamily="34" charset="0"/>
+                <a:cs typeface="Arial" panose="020B0604020202020204" pitchFamily="34" charset="0"/>
+              </a:rPr>
+              <a:t>York</a:t>
+            </a:r>
+            <a:endParaRPr lang="zh-CN" altLang="en-US" sz="2000" b="1" dirty="0">
+              <a:latin typeface="Arial" panose="020B0604020202020204" pitchFamily="34" charset="0"/>
+              <a:cs typeface="Arial" panose="020B0604020202020204" pitchFamily="34" charset="0"/>
+            </a:endParaRPr>
+          </a:p>
+        </p:txBody>
+      </p:sp>
+      <p:sp>
+        <p:nvSpPr>
+          <p:cNvPr id="27" name="文本框 26">
+            <a:extLst>
+              <a:ext uri="{FF2B5EF4-FFF2-40B4-BE49-F238E27FC236}">
+                <a16:creationId xmlns:a16="http://schemas.microsoft.com/office/drawing/2014/main" id="{0D529A90-9AEB-FB67-1B66-034097B231B7}"/>
+              </a:ext>
+            </a:extLst>
+          </p:cNvPr>
+          <p:cNvSpPr txBox="1"/>
+          <p:nvPr/>
+        </p:nvSpPr>
+        <p:spPr>
+          <a:xfrm>
+            <a:off x="3329827" y="1022840"/>
+            <a:ext cx="1830289" cy="400110"/>
+          </a:xfrm>
+          <a:prstGeom prst="rect">
+            <a:avLst/>
+          </a:prstGeom>
+          <a:noFill/>
+        </p:spPr>
+        <p:txBody>
+          <a:bodyPr wrap="square" rtlCol="0">
+            <a:spAutoFit/>
+          </a:bodyPr>
+          <a:lstStyle/>
+          <a:p>
+            <a:r>
+              <a:rPr lang="en-US" altLang="zh-CN" sz="2000" b="1" dirty="0">
+                <a:latin typeface="Arial" panose="020B0604020202020204" pitchFamily="34" charset="0"/>
+                <a:cs typeface="Arial" panose="020B0604020202020204" pitchFamily="34" charset="0"/>
+              </a:rPr>
+              <a:t>Guangzhou</a:t>
+            </a:r>
+            <a:endParaRPr lang="zh-CN" altLang="en-US" sz="2000" b="1" dirty="0">
+              <a:latin typeface="Arial" panose="020B0604020202020204" pitchFamily="34" charset="0"/>
+              <a:cs typeface="Arial" panose="020B0604020202020204" pitchFamily="34" charset="0"/>
+            </a:endParaRPr>
+          </a:p>
+        </p:txBody>
+      </p:sp>
+      <p:sp>
+        <p:nvSpPr>
+          <p:cNvPr id="28" name="文本框 27">
+            <a:extLst>
+              <a:ext uri="{FF2B5EF4-FFF2-40B4-BE49-F238E27FC236}">
+                <a16:creationId xmlns:a16="http://schemas.microsoft.com/office/drawing/2014/main" id="{90C8E853-4C64-CCDB-D860-E630C526672B}"/>
+              </a:ext>
+            </a:extLst>
+          </p:cNvPr>
+          <p:cNvSpPr txBox="1"/>
+          <p:nvPr/>
+        </p:nvSpPr>
+        <p:spPr>
+          <a:xfrm>
+            <a:off x="1066380" y="1864036"/>
+            <a:ext cx="1534402" cy="276999"/>
+          </a:xfrm>
+          <a:prstGeom prst="rect">
+            <a:avLst/>
+          </a:prstGeom>
+          <a:noFill/>
+        </p:spPr>
+        <p:txBody>
+          <a:bodyPr wrap="square" rtlCol="0">
+            <a:spAutoFit/>
+          </a:bodyPr>
+          <a:lstStyle/>
+          <a:p>
+            <a:r>
+              <a:rPr lang="en-US" altLang="zh-CN" sz="1200" dirty="0">
+                <a:solidFill>
+                  <a:srgbClr val="404040"/>
+                </a:solidFill>
+                <a:latin typeface="Arial" panose="020B0604020202020204" pitchFamily="34" charset="0"/>
+                <a:cs typeface="Arial" panose="020B0604020202020204" pitchFamily="34" charset="0"/>
+              </a:rPr>
+              <a:t>Passenger name</a:t>
+            </a:r>
+            <a:endParaRPr lang="zh-CN" altLang="en-US" sz="1200" dirty="0">
+              <a:solidFill>
+                <a:srgbClr val="404040"/>
+              </a:solidFill>
+              <a:latin typeface="Arial" panose="020B0604020202020204" pitchFamily="34" charset="0"/>
+              <a:cs typeface="Arial" panose="020B0604020202020204" pitchFamily="34" charset="0"/>
+            </a:endParaRPr>
+          </a:p>
+        </p:txBody>
+      </p:sp>
+      <p:sp>
+        <p:nvSpPr>
+          <p:cNvPr id="29" name="文本框 28">
+            <a:extLst>
+              <a:ext uri="{FF2B5EF4-FFF2-40B4-BE49-F238E27FC236}">
+                <a16:creationId xmlns:a16="http://schemas.microsoft.com/office/drawing/2014/main" id="{3F4378DE-B4FD-817E-3226-F2A96723B4BE}"/>
+              </a:ext>
+            </a:extLst>
+          </p:cNvPr>
+          <p:cNvSpPr txBox="1"/>
+          <p:nvPr/>
+        </p:nvSpPr>
+        <p:spPr>
+          <a:xfrm>
+            <a:off x="1066380" y="2258917"/>
+            <a:ext cx="1534402" cy="276999"/>
+          </a:xfrm>
+          <a:prstGeom prst="rect">
+            <a:avLst/>
+          </a:prstGeom>
+          <a:noFill/>
+        </p:spPr>
+        <p:txBody>
+          <a:bodyPr wrap="square" rtlCol="0">
+            <a:spAutoFit/>
+          </a:bodyPr>
+          <a:lstStyle/>
+          <a:p>
+            <a:r>
+              <a:rPr lang="en-US" altLang="zh-CN" sz="1200" dirty="0">
+                <a:solidFill>
+                  <a:srgbClr val="404040"/>
+                </a:solidFill>
+                <a:latin typeface="Arial" panose="020B0604020202020204" pitchFamily="34" charset="0"/>
+                <a:cs typeface="Arial" panose="020B0604020202020204" pitchFamily="34" charset="0"/>
+              </a:rPr>
+              <a:t>Date</a:t>
+            </a:r>
+            <a:endParaRPr lang="zh-CN" altLang="en-US" sz="1400" dirty="0">
+              <a:solidFill>
+                <a:srgbClr val="404040"/>
+              </a:solidFill>
+              <a:latin typeface="Arial" panose="020B0604020202020204" pitchFamily="34" charset="0"/>
+              <a:cs typeface="Arial" panose="020B0604020202020204" pitchFamily="34" charset="0"/>
+            </a:endParaRPr>
+          </a:p>
+        </p:txBody>
+      </p:sp>
+      <p:sp>
+        <p:nvSpPr>
+          <p:cNvPr id="30" name="文本框 29">
+            <a:extLst>
+              <a:ext uri="{FF2B5EF4-FFF2-40B4-BE49-F238E27FC236}">
+                <a16:creationId xmlns:a16="http://schemas.microsoft.com/office/drawing/2014/main" id="{9D993EE1-10E5-74FC-EFA1-7FFEB433D193}"/>
+              </a:ext>
+            </a:extLst>
+          </p:cNvPr>
+          <p:cNvSpPr txBox="1"/>
+          <p:nvPr/>
+        </p:nvSpPr>
+        <p:spPr>
+          <a:xfrm>
+            <a:off x="1066382" y="2799598"/>
+            <a:ext cx="1534402" cy="276999"/>
+          </a:xfrm>
+          <a:prstGeom prst="rect">
+            <a:avLst/>
+          </a:prstGeom>
+          <a:noFill/>
+        </p:spPr>
+        <p:txBody>
+          <a:bodyPr wrap="square" rtlCol="0">
+            <a:spAutoFit/>
+          </a:bodyPr>
+          <a:lstStyle/>
+          <a:p>
+            <a:r>
+              <a:rPr lang="en-US" altLang="zh-CN" sz="1200" dirty="0">
+                <a:solidFill>
+                  <a:srgbClr val="404040"/>
+                </a:solidFill>
+                <a:latin typeface="Arial" panose="020B0604020202020204" pitchFamily="34" charset="0"/>
+                <a:cs typeface="Arial" panose="020B0604020202020204" pitchFamily="34" charset="0"/>
+              </a:rPr>
+              <a:t>Class</a:t>
+            </a:r>
+            <a:endParaRPr lang="zh-CN" altLang="en-US" sz="1400" dirty="0">
+              <a:solidFill>
+                <a:srgbClr val="404040"/>
+              </a:solidFill>
+              <a:latin typeface="Arial" panose="020B0604020202020204" pitchFamily="34" charset="0"/>
+              <a:cs typeface="Arial" panose="020B0604020202020204" pitchFamily="34" charset="0"/>
+            </a:endParaRPr>
+          </a:p>
+        </p:txBody>
+      </p:sp>
+      <p:sp>
+        <p:nvSpPr>
+          <p:cNvPr id="31" name="文本框 30">
+            <a:extLst>
+              <a:ext uri="{FF2B5EF4-FFF2-40B4-BE49-F238E27FC236}">
+                <a16:creationId xmlns:a16="http://schemas.microsoft.com/office/drawing/2014/main" id="{DBCF3DB2-7FC0-5E56-33A8-B70012313D82}"/>
+              </a:ext>
+            </a:extLst>
+          </p:cNvPr>
+          <p:cNvSpPr txBox="1"/>
+          <p:nvPr/>
+        </p:nvSpPr>
+        <p:spPr>
+          <a:xfrm>
+            <a:off x="1066380" y="1679332"/>
+            <a:ext cx="1830289" cy="307777"/>
+          </a:xfrm>
+          <a:prstGeom prst="rect">
+            <a:avLst/>
+          </a:prstGeom>
+          <a:noFill/>
+        </p:spPr>
+        <p:txBody>
+          <a:bodyPr wrap="square" rtlCol="0">
+            <a:spAutoFit/>
+          </a:bodyPr>
+          <a:lstStyle/>
+          <a:p>
+            <a:r>
+              <a:rPr lang="en-US" altLang="zh-CN" sz="1400" b="1" dirty="0">
+                <a:latin typeface="Arial" panose="020B0604020202020204" pitchFamily="34" charset="0"/>
+                <a:cs typeface="Arial" panose="020B0604020202020204" pitchFamily="34" charset="0"/>
+              </a:rPr>
+              <a:t>Jack</a:t>
+            </a:r>
+            <a:endParaRPr lang="zh-CN" altLang="en-US" sz="1600" b="1" dirty="0">
+              <a:latin typeface="Arial" panose="020B0604020202020204" pitchFamily="34" charset="0"/>
+              <a:cs typeface="Arial" panose="020B0604020202020204" pitchFamily="34" charset="0"/>
+            </a:endParaRPr>
+          </a:p>
+        </p:txBody>
+      </p:sp>
+      <p:sp>
+        <p:nvSpPr>
+          <p:cNvPr id="32" name="文本框 31">
+            <a:extLst>
+              <a:ext uri="{FF2B5EF4-FFF2-40B4-BE49-F238E27FC236}">
+                <a16:creationId xmlns:a16="http://schemas.microsoft.com/office/drawing/2014/main" id="{063A7EC3-39BC-6D4B-3E5F-9252F7DEAD05}"/>
+              </a:ext>
+            </a:extLst>
+          </p:cNvPr>
+          <p:cNvSpPr txBox="1"/>
+          <p:nvPr/>
+        </p:nvSpPr>
+        <p:spPr>
+          <a:xfrm>
+            <a:off x="1066379" y="2081714"/>
+            <a:ext cx="1830289" cy="307777"/>
+          </a:xfrm>
+          <a:prstGeom prst="rect">
+            <a:avLst/>
+          </a:prstGeom>
+          <a:noFill/>
+        </p:spPr>
+        <p:txBody>
+          <a:bodyPr wrap="square" rtlCol="0">
+            <a:spAutoFit/>
+          </a:bodyPr>
+          <a:lstStyle/>
+          <a:p>
+            <a:r>
+              <a:rPr lang="en-US" altLang="zh-CN" sz="1400" b="1" dirty="0">
+                <a:latin typeface="Arial" panose="020B0604020202020204" pitchFamily="34" charset="0"/>
+                <a:cs typeface="Arial" panose="020B0604020202020204" pitchFamily="34" charset="0"/>
+              </a:rPr>
+              <a:t>2022/5/19</a:t>
+            </a:r>
+            <a:endParaRPr lang="zh-CN" altLang="en-US" sz="1600" b="1" dirty="0">
+              <a:latin typeface="Arial" panose="020B0604020202020204" pitchFamily="34" charset="0"/>
+              <a:cs typeface="Arial" panose="020B0604020202020204" pitchFamily="34" charset="0"/>
+            </a:endParaRPr>
+          </a:p>
+        </p:txBody>
+      </p:sp>
+      <p:sp>
+        <p:nvSpPr>
+          <p:cNvPr id="33" name="文本框 32">
+            <a:extLst>
+              <a:ext uri="{FF2B5EF4-FFF2-40B4-BE49-F238E27FC236}">
+                <a16:creationId xmlns:a16="http://schemas.microsoft.com/office/drawing/2014/main" id="{0D0B6D70-9010-777B-642D-A15AF569D638}"/>
+              </a:ext>
+            </a:extLst>
+          </p:cNvPr>
+          <p:cNvSpPr txBox="1"/>
+          <p:nvPr/>
+        </p:nvSpPr>
+        <p:spPr>
+          <a:xfrm>
+            <a:off x="1066380" y="2626033"/>
+            <a:ext cx="1830289" cy="307777"/>
+          </a:xfrm>
+          <a:prstGeom prst="rect">
+            <a:avLst/>
+          </a:prstGeom>
+          <a:noFill/>
+        </p:spPr>
+        <p:txBody>
+          <a:bodyPr wrap="square" rtlCol="0">
+            <a:spAutoFit/>
+          </a:bodyPr>
+          <a:lstStyle/>
+          <a:p>
+            <a:r>
+              <a:rPr lang="en-US" altLang="zh-CN" sz="1400" b="1" dirty="0">
+                <a:latin typeface="Arial" panose="020B0604020202020204" pitchFamily="34" charset="0"/>
+                <a:cs typeface="Arial" panose="020B0604020202020204" pitchFamily="34" charset="0"/>
+              </a:rPr>
+              <a:t>Seat Premium</a:t>
+            </a:r>
+            <a:endParaRPr lang="zh-CN" altLang="en-US" sz="1600" b="1" dirty="0">
+              <a:latin typeface="Arial" panose="020B0604020202020204" pitchFamily="34" charset="0"/>
+              <a:cs typeface="Arial" panose="020B0604020202020204" pitchFamily="34" charset="0"/>
+            </a:endParaRPr>
+          </a:p>
+        </p:txBody>
+      </p:sp>
+      <p:sp>
+        <p:nvSpPr>
+          <p:cNvPr id="34" name="文本框 33">
+            <a:extLst>
+              <a:ext uri="{FF2B5EF4-FFF2-40B4-BE49-F238E27FC236}">
+                <a16:creationId xmlns:a16="http://schemas.microsoft.com/office/drawing/2014/main" id="{E6C1C881-CD71-F33A-3CC9-FAB3DC70527B}"/>
+              </a:ext>
+            </a:extLst>
+          </p:cNvPr>
+          <p:cNvSpPr txBox="1"/>
+          <p:nvPr/>
+        </p:nvSpPr>
+        <p:spPr>
+          <a:xfrm>
+            <a:off x="5337636" y="1263821"/>
+            <a:ext cx="1534402" cy="276999"/>
+          </a:xfrm>
+          <a:prstGeom prst="rect">
+            <a:avLst/>
+          </a:prstGeom>
+          <a:noFill/>
+        </p:spPr>
+        <p:txBody>
+          <a:bodyPr wrap="square" rtlCol="0">
+            <a:spAutoFit/>
+          </a:bodyPr>
+          <a:lstStyle/>
+          <a:p>
+            <a:r>
+              <a:rPr lang="en-US" altLang="zh-CN" sz="1200" dirty="0">
+                <a:solidFill>
+                  <a:srgbClr val="404040"/>
+                </a:solidFill>
+                <a:latin typeface="Arial" panose="020B0604020202020204" pitchFamily="34" charset="0"/>
+                <a:cs typeface="Arial" panose="020B0604020202020204" pitchFamily="34" charset="0"/>
+              </a:rPr>
+              <a:t>Flight Number</a:t>
+            </a:r>
+            <a:endParaRPr lang="zh-CN" altLang="en-US" sz="1200" dirty="0">
+              <a:solidFill>
+                <a:srgbClr val="404040"/>
+              </a:solidFill>
+              <a:latin typeface="Arial" panose="020B0604020202020204" pitchFamily="34" charset="0"/>
+              <a:cs typeface="Arial" panose="020B0604020202020204" pitchFamily="34" charset="0"/>
+            </a:endParaRPr>
+          </a:p>
+        </p:txBody>
+      </p:sp>
+      <p:sp>
+        <p:nvSpPr>
+          <p:cNvPr id="35" name="文本框 34">
+            <a:extLst>
+              <a:ext uri="{FF2B5EF4-FFF2-40B4-BE49-F238E27FC236}">
+                <a16:creationId xmlns:a16="http://schemas.microsoft.com/office/drawing/2014/main" id="{92C05883-EBA1-D2E0-61E5-1B4E020BAA33}"/>
+              </a:ext>
+            </a:extLst>
+          </p:cNvPr>
+          <p:cNvSpPr txBox="1"/>
+          <p:nvPr/>
+        </p:nvSpPr>
+        <p:spPr>
+          <a:xfrm>
+            <a:off x="5332337" y="1022759"/>
+            <a:ext cx="1176378" cy="400110"/>
+          </a:xfrm>
+          <a:prstGeom prst="rect">
+            <a:avLst/>
+          </a:prstGeom>
+          <a:noFill/>
+        </p:spPr>
+        <p:txBody>
+          <a:bodyPr wrap="square" rtlCol="0">
+            <a:spAutoFit/>
+          </a:bodyPr>
+          <a:lstStyle/>
+          <a:p>
+            <a:r>
+              <a:rPr lang="en-US" altLang="zh-CN" sz="2000" b="1" dirty="0">
+                <a:solidFill>
+                  <a:srgbClr val="1C1C1C"/>
+                </a:solidFill>
+                <a:latin typeface="Arial" panose="020B0604020202020204" pitchFamily="34" charset="0"/>
+                <a:cs typeface="Arial" panose="020B0604020202020204" pitchFamily="34" charset="0"/>
+              </a:rPr>
+              <a:t>CA0001</a:t>
+            </a:r>
+            <a:endParaRPr lang="zh-CN" altLang="en-US" sz="2000" b="1" dirty="0">
+              <a:solidFill>
+                <a:srgbClr val="1C1C1C"/>
+              </a:solidFill>
+              <a:latin typeface="Arial" panose="020B0604020202020204" pitchFamily="34" charset="0"/>
+              <a:cs typeface="Arial" panose="020B0604020202020204" pitchFamily="34" charset="0"/>
+            </a:endParaRPr>
+          </a:p>
+        </p:txBody>
+      </p:sp>
+      <p:sp>
+        <p:nvSpPr>
+          <p:cNvPr id="36" name="文本框 35">
+            <a:extLst>
+              <a:ext uri="{FF2B5EF4-FFF2-40B4-BE49-F238E27FC236}">
+                <a16:creationId xmlns:a16="http://schemas.microsoft.com/office/drawing/2014/main" id="{16D06C21-551E-2EAA-BEED-C314DB3119CA}"/>
+              </a:ext>
+            </a:extLst>
+          </p:cNvPr>
+          <p:cNvSpPr txBox="1"/>
+          <p:nvPr/>
+        </p:nvSpPr>
+        <p:spPr>
+          <a:xfrm>
+            <a:off x="5337636" y="2002238"/>
+            <a:ext cx="1534402" cy="276999"/>
+          </a:xfrm>
+          <a:prstGeom prst="rect">
+            <a:avLst/>
+          </a:prstGeom>
+          <a:noFill/>
+        </p:spPr>
+        <p:txBody>
+          <a:bodyPr wrap="square" rtlCol="0">
+            <a:spAutoFit/>
+          </a:bodyPr>
+          <a:lstStyle/>
+          <a:p>
+            <a:r>
+              <a:rPr lang="en-US" altLang="zh-CN" sz="1200" dirty="0">
+                <a:solidFill>
+                  <a:srgbClr val="404040"/>
+                </a:solidFill>
+                <a:latin typeface="Arial" panose="020B0604020202020204" pitchFamily="34" charset="0"/>
+                <a:cs typeface="Arial" panose="020B0604020202020204" pitchFamily="34" charset="0"/>
+              </a:rPr>
+              <a:t>Boarding Time</a:t>
+            </a:r>
+            <a:endParaRPr lang="zh-CN" altLang="en-US" sz="1200" dirty="0">
+              <a:solidFill>
+                <a:srgbClr val="404040"/>
+              </a:solidFill>
+              <a:latin typeface="Arial" panose="020B0604020202020204" pitchFamily="34" charset="0"/>
+              <a:cs typeface="Arial" panose="020B0604020202020204" pitchFamily="34" charset="0"/>
+            </a:endParaRPr>
+          </a:p>
+        </p:txBody>
+      </p:sp>
+      <p:sp>
+        <p:nvSpPr>
+          <p:cNvPr id="37" name="文本框 36">
+            <a:extLst>
+              <a:ext uri="{FF2B5EF4-FFF2-40B4-BE49-F238E27FC236}">
+                <a16:creationId xmlns:a16="http://schemas.microsoft.com/office/drawing/2014/main" id="{9CAA8569-816E-3C13-45CC-49BA8CC5A3B5}"/>
+              </a:ext>
+            </a:extLst>
+          </p:cNvPr>
+          <p:cNvSpPr txBox="1"/>
+          <p:nvPr/>
+        </p:nvSpPr>
+        <p:spPr>
+          <a:xfrm>
+            <a:off x="5337636" y="2799598"/>
+            <a:ext cx="1534402" cy="276999"/>
+          </a:xfrm>
+          <a:prstGeom prst="rect">
+            <a:avLst/>
+          </a:prstGeom>
+          <a:noFill/>
+        </p:spPr>
+        <p:txBody>
+          <a:bodyPr wrap="square" rtlCol="0">
+            <a:spAutoFit/>
+          </a:bodyPr>
+          <a:lstStyle/>
+          <a:p>
+            <a:r>
+              <a:rPr lang="en-US" altLang="zh-CN" sz="1200" dirty="0">
+                <a:solidFill>
+                  <a:srgbClr val="404040"/>
+                </a:solidFill>
+                <a:latin typeface="Arial" panose="020B0604020202020204" pitchFamily="34" charset="0"/>
+                <a:cs typeface="Arial" panose="020B0604020202020204" pitchFamily="34" charset="0"/>
+              </a:rPr>
+              <a:t>Seat</a:t>
+            </a:r>
+            <a:endParaRPr lang="zh-CN" altLang="en-US" sz="1200" dirty="0">
+              <a:solidFill>
+                <a:srgbClr val="404040"/>
+              </a:solidFill>
+              <a:latin typeface="Arial" panose="020B0604020202020204" pitchFamily="34" charset="0"/>
+              <a:cs typeface="Arial" panose="020B0604020202020204" pitchFamily="34" charset="0"/>
+            </a:endParaRPr>
+          </a:p>
+        </p:txBody>
+      </p:sp>
+      <p:sp>
+        <p:nvSpPr>
+          <p:cNvPr id="38" name="文本框 37">
+            <a:extLst>
+              <a:ext uri="{FF2B5EF4-FFF2-40B4-BE49-F238E27FC236}">
+                <a16:creationId xmlns:a16="http://schemas.microsoft.com/office/drawing/2014/main" id="{AD94300C-CACF-DD4C-7A8C-54D803BC6321}"/>
+              </a:ext>
+            </a:extLst>
+          </p:cNvPr>
+          <p:cNvSpPr txBox="1"/>
+          <p:nvPr/>
+        </p:nvSpPr>
+        <p:spPr>
+          <a:xfrm>
+            <a:off x="5332336" y="1753921"/>
+            <a:ext cx="1176379" cy="400110"/>
+          </a:xfrm>
+          <a:prstGeom prst="rect">
+            <a:avLst/>
+          </a:prstGeom>
+          <a:noFill/>
+        </p:spPr>
+        <p:txBody>
+          <a:bodyPr wrap="square" rtlCol="0">
+            <a:spAutoFit/>
+          </a:bodyPr>
+          <a:lstStyle/>
+          <a:p>
+            <a:r>
+              <a:rPr lang="en-US" altLang="zh-CN" sz="2000" b="1" dirty="0">
+                <a:solidFill>
+                  <a:srgbClr val="1C1C1C"/>
+                </a:solidFill>
+                <a:latin typeface="Arial" panose="020B0604020202020204" pitchFamily="34" charset="0"/>
+                <a:cs typeface="Arial" panose="020B0604020202020204" pitchFamily="34" charset="0"/>
+              </a:rPr>
+              <a:t>05:20</a:t>
+            </a:r>
+            <a:endParaRPr lang="zh-CN" altLang="en-US" sz="2000" b="1" dirty="0">
+              <a:solidFill>
+                <a:srgbClr val="1C1C1C"/>
+              </a:solidFill>
+              <a:latin typeface="Arial" panose="020B0604020202020204" pitchFamily="34" charset="0"/>
+              <a:cs typeface="Arial" panose="020B0604020202020204" pitchFamily="34" charset="0"/>
+            </a:endParaRPr>
+          </a:p>
+        </p:txBody>
+      </p:sp>
+      <p:sp>
+        <p:nvSpPr>
+          <p:cNvPr id="39" name="文本框 38">
+            <a:extLst>
+              <a:ext uri="{FF2B5EF4-FFF2-40B4-BE49-F238E27FC236}">
+                <a16:creationId xmlns:a16="http://schemas.microsoft.com/office/drawing/2014/main" id="{3EA5D10E-C811-9B85-449E-E5E3754FB9B6}"/>
+              </a:ext>
+            </a:extLst>
+          </p:cNvPr>
+          <p:cNvSpPr txBox="1"/>
+          <p:nvPr/>
+        </p:nvSpPr>
+        <p:spPr>
+          <a:xfrm>
+            <a:off x="5330257" y="2555604"/>
+            <a:ext cx="756981" cy="400110"/>
+          </a:xfrm>
+          <a:prstGeom prst="rect">
+            <a:avLst/>
+          </a:prstGeom>
+          <a:noFill/>
+        </p:spPr>
+        <p:txBody>
+          <a:bodyPr wrap="square" rtlCol="0">
+            <a:spAutoFit/>
+          </a:bodyPr>
+          <a:lstStyle/>
+          <a:p>
+            <a:r>
+              <a:rPr lang="en-US" altLang="zh-CN" sz="2000" b="1" dirty="0">
+                <a:solidFill>
+                  <a:srgbClr val="1C1C1C"/>
+                </a:solidFill>
+                <a:latin typeface="Arial" panose="020B0604020202020204" pitchFamily="34" charset="0"/>
+                <a:cs typeface="Arial" panose="020B0604020202020204" pitchFamily="34" charset="0"/>
+              </a:rPr>
+              <a:t>20A</a:t>
+            </a:r>
+            <a:endParaRPr lang="zh-CN" altLang="en-US" sz="2000" b="1" dirty="0">
+              <a:solidFill>
+                <a:srgbClr val="1C1C1C"/>
+              </a:solidFill>
+              <a:latin typeface="Arial" panose="020B0604020202020204" pitchFamily="34" charset="0"/>
+              <a:cs typeface="Arial" panose="020B0604020202020204" pitchFamily="34" charset="0"/>
+            </a:endParaRPr>
+          </a:p>
+        </p:txBody>
+      </p:sp>
+      <p:sp>
+        <p:nvSpPr>
+          <p:cNvPr id="40" name="文本框 39">
+            <a:extLst>
+              <a:ext uri="{FF2B5EF4-FFF2-40B4-BE49-F238E27FC236}">
+                <a16:creationId xmlns:a16="http://schemas.microsoft.com/office/drawing/2014/main" id="{D6539A28-48FE-184E-62A8-6DA42F01DE57}"/>
+              </a:ext>
+            </a:extLst>
+          </p:cNvPr>
+          <p:cNvSpPr txBox="1"/>
+          <p:nvPr/>
+        </p:nvSpPr>
+        <p:spPr>
+          <a:xfrm>
+            <a:off x="6872038" y="1263821"/>
+            <a:ext cx="1534402" cy="276999"/>
+          </a:xfrm>
+          <a:prstGeom prst="rect">
+            <a:avLst/>
+          </a:prstGeom>
+          <a:noFill/>
+        </p:spPr>
+        <p:txBody>
+          <a:bodyPr wrap="square" rtlCol="0">
+            <a:spAutoFit/>
+          </a:bodyPr>
+          <a:lstStyle/>
+          <a:p>
+            <a:r>
+              <a:rPr lang="en-US" altLang="zh-CN" sz="1200" dirty="0">
+                <a:solidFill>
+                  <a:srgbClr val="404040"/>
+                </a:solidFill>
+                <a:latin typeface="Arial" panose="020B0604020202020204" pitchFamily="34" charset="0"/>
+                <a:cs typeface="Arial" panose="020B0604020202020204" pitchFamily="34" charset="0"/>
+              </a:rPr>
+              <a:t>Terminal</a:t>
+            </a:r>
+            <a:endParaRPr lang="zh-CN" altLang="en-US" sz="1200" dirty="0">
+              <a:solidFill>
+                <a:srgbClr val="404040"/>
+              </a:solidFill>
+              <a:latin typeface="Arial" panose="020B0604020202020204" pitchFamily="34" charset="0"/>
+              <a:cs typeface="Arial" panose="020B0604020202020204" pitchFamily="34" charset="0"/>
+            </a:endParaRPr>
+          </a:p>
+        </p:txBody>
+      </p:sp>
+      <p:sp>
+        <p:nvSpPr>
+          <p:cNvPr id="41" name="文本框 40">
+            <a:extLst>
+              <a:ext uri="{FF2B5EF4-FFF2-40B4-BE49-F238E27FC236}">
+                <a16:creationId xmlns:a16="http://schemas.microsoft.com/office/drawing/2014/main" id="{3C06878A-78FF-1FCA-CB04-E18E99045E88}"/>
+              </a:ext>
+            </a:extLst>
+          </p:cNvPr>
+          <p:cNvSpPr txBox="1"/>
+          <p:nvPr/>
+        </p:nvSpPr>
+        <p:spPr>
+          <a:xfrm>
+            <a:off x="6872038" y="1978923"/>
+            <a:ext cx="1534402" cy="276999"/>
+          </a:xfrm>
+          <a:prstGeom prst="rect">
+            <a:avLst/>
+          </a:prstGeom>
+          <a:noFill/>
+        </p:spPr>
+        <p:txBody>
+          <a:bodyPr wrap="square" rtlCol="0">
+            <a:spAutoFit/>
+          </a:bodyPr>
+          <a:lstStyle/>
+          <a:p>
+            <a:r>
+              <a:rPr lang="en-US" altLang="zh-CN" sz="1200" dirty="0">
+                <a:solidFill>
+                  <a:srgbClr val="404040"/>
+                </a:solidFill>
+                <a:latin typeface="Arial" panose="020B0604020202020204" pitchFamily="34" charset="0"/>
+                <a:cs typeface="Arial" panose="020B0604020202020204" pitchFamily="34" charset="0"/>
+              </a:rPr>
+              <a:t>Gate</a:t>
+            </a:r>
+            <a:endParaRPr lang="zh-CN" altLang="en-US" sz="1200" dirty="0">
+              <a:solidFill>
+                <a:srgbClr val="404040"/>
+              </a:solidFill>
+              <a:latin typeface="Arial" panose="020B0604020202020204" pitchFamily="34" charset="0"/>
+              <a:cs typeface="Arial" panose="020B0604020202020204" pitchFamily="34" charset="0"/>
+            </a:endParaRPr>
+          </a:p>
+        </p:txBody>
+      </p:sp>
+      <p:sp>
+        <p:nvSpPr>
+          <p:cNvPr id="42" name="文本框 41">
+            <a:extLst>
+              <a:ext uri="{FF2B5EF4-FFF2-40B4-BE49-F238E27FC236}">
+                <a16:creationId xmlns:a16="http://schemas.microsoft.com/office/drawing/2014/main" id="{2727A4E6-C05E-30E1-8C4E-2EACB9784867}"/>
+              </a:ext>
+            </a:extLst>
+          </p:cNvPr>
+          <p:cNvSpPr txBox="1"/>
+          <p:nvPr/>
+        </p:nvSpPr>
+        <p:spPr>
+          <a:xfrm>
+            <a:off x="6873813" y="1012095"/>
+            <a:ext cx="1176378" cy="400110"/>
+          </a:xfrm>
+          <a:prstGeom prst="rect">
+            <a:avLst/>
+          </a:prstGeom>
+          <a:noFill/>
+        </p:spPr>
+        <p:txBody>
+          <a:bodyPr wrap="square" rtlCol="0">
+            <a:spAutoFit/>
+          </a:bodyPr>
+          <a:lstStyle/>
+          <a:p>
+            <a:r>
+              <a:rPr lang="en-US" altLang="zh-CN" sz="2000" b="1" dirty="0">
+                <a:solidFill>
+                  <a:srgbClr val="1C1C1C"/>
+                </a:solidFill>
+                <a:latin typeface="Arial" panose="020B0604020202020204" pitchFamily="34" charset="0"/>
+                <a:cs typeface="Arial" panose="020B0604020202020204" pitchFamily="34" charset="0"/>
+              </a:rPr>
+              <a:t>1</a:t>
+            </a:r>
+            <a:endParaRPr lang="zh-CN" altLang="en-US" sz="2000" b="1" dirty="0">
+              <a:solidFill>
+                <a:srgbClr val="1C1C1C"/>
+              </a:solidFill>
+              <a:latin typeface="Arial" panose="020B0604020202020204" pitchFamily="34" charset="0"/>
+              <a:cs typeface="Arial" panose="020B0604020202020204" pitchFamily="34" charset="0"/>
+            </a:endParaRPr>
+          </a:p>
+        </p:txBody>
+      </p:sp>
+      <p:sp>
+        <p:nvSpPr>
+          <p:cNvPr id="43" name="文本框 42">
+            <a:extLst>
+              <a:ext uri="{FF2B5EF4-FFF2-40B4-BE49-F238E27FC236}">
+                <a16:creationId xmlns:a16="http://schemas.microsoft.com/office/drawing/2014/main" id="{68EBEBF7-4652-14F5-A277-E3904EFA723D}"/>
+              </a:ext>
+            </a:extLst>
+          </p:cNvPr>
+          <p:cNvSpPr txBox="1"/>
+          <p:nvPr/>
+        </p:nvSpPr>
+        <p:spPr>
+          <a:xfrm>
+            <a:off x="6878822" y="1740627"/>
+            <a:ext cx="1176378" cy="400110"/>
+          </a:xfrm>
+          <a:prstGeom prst="rect">
+            <a:avLst/>
+          </a:prstGeom>
+          <a:noFill/>
+        </p:spPr>
+        <p:txBody>
+          <a:bodyPr wrap="square" rtlCol="0">
+            <a:spAutoFit/>
+          </a:bodyPr>
+          <a:lstStyle/>
+          <a:p>
+            <a:r>
+              <a:rPr lang="en-US" altLang="zh-CN" sz="2000" b="1" dirty="0">
+                <a:solidFill>
+                  <a:srgbClr val="1C1C1C"/>
+                </a:solidFill>
+                <a:latin typeface="Arial" panose="020B0604020202020204" pitchFamily="34" charset="0"/>
+                <a:cs typeface="Arial" panose="020B0604020202020204" pitchFamily="34" charset="0"/>
+              </a:rPr>
+              <a:t>C22</a:t>
+            </a:r>
+            <a:endParaRPr lang="zh-CN" altLang="en-US" sz="2000" b="1" dirty="0">
+              <a:solidFill>
+                <a:srgbClr val="1C1C1C"/>
+              </a:solidFill>
+              <a:latin typeface="Arial" panose="020B0604020202020204" pitchFamily="34" charset="0"/>
+              <a:cs typeface="Arial" panose="020B0604020202020204" pitchFamily="34" charset="0"/>
+            </a:endParaRPr>
+          </a:p>
+        </p:txBody>
+      </p:sp>
+      <p:sp>
+        <p:nvSpPr>
+          <p:cNvPr id="46" name="文本框 45">
+            <a:extLst>
+              <a:ext uri="{FF2B5EF4-FFF2-40B4-BE49-F238E27FC236}">
+                <a16:creationId xmlns:a16="http://schemas.microsoft.com/office/drawing/2014/main" id="{F50F7B0B-1D12-66EF-5A8F-B222B40C717A}"/>
+              </a:ext>
+            </a:extLst>
+          </p:cNvPr>
+          <p:cNvSpPr txBox="1"/>
+          <p:nvPr/>
+        </p:nvSpPr>
+        <p:spPr>
+          <a:xfrm>
+            <a:off x="8759028" y="1096457"/>
+            <a:ext cx="1534402" cy="276999"/>
+          </a:xfrm>
+          <a:prstGeom prst="rect">
+            <a:avLst/>
+          </a:prstGeom>
+          <a:noFill/>
+        </p:spPr>
+        <p:txBody>
+          <a:bodyPr wrap="square" rtlCol="0">
+            <a:spAutoFit/>
+          </a:bodyPr>
+          <a:lstStyle/>
+          <a:p>
+            <a:r>
+              <a:rPr lang="en-US" altLang="zh-CN" sz="1200" dirty="0">
+                <a:solidFill>
+                  <a:srgbClr val="404040"/>
+                </a:solidFill>
+                <a:latin typeface="Arial" panose="020B0604020202020204" pitchFamily="34" charset="0"/>
+                <a:cs typeface="Arial" panose="020B0604020202020204" pitchFamily="34" charset="0"/>
+              </a:rPr>
+              <a:t>Passenger name</a:t>
+            </a:r>
+            <a:endParaRPr lang="zh-CN" altLang="en-US" sz="1200" dirty="0">
+              <a:solidFill>
+                <a:srgbClr val="404040"/>
+              </a:solidFill>
+              <a:latin typeface="Arial" panose="020B0604020202020204" pitchFamily="34" charset="0"/>
+              <a:cs typeface="Arial" panose="020B0604020202020204" pitchFamily="34" charset="0"/>
+            </a:endParaRPr>
+          </a:p>
+        </p:txBody>
+      </p:sp>
+      <p:sp>
+        <p:nvSpPr>
+          <p:cNvPr id="47" name="文本框 46">
+            <a:extLst>
+              <a:ext uri="{FF2B5EF4-FFF2-40B4-BE49-F238E27FC236}">
+                <a16:creationId xmlns:a16="http://schemas.microsoft.com/office/drawing/2014/main" id="{D5AC2F63-81E4-A294-DA78-2656360F4B9F}"/>
+              </a:ext>
+            </a:extLst>
+          </p:cNvPr>
+          <p:cNvSpPr txBox="1"/>
+          <p:nvPr/>
+        </p:nvSpPr>
+        <p:spPr>
+          <a:xfrm>
+            <a:off x="8759028" y="1491338"/>
+            <a:ext cx="1534402" cy="276999"/>
+          </a:xfrm>
+          <a:prstGeom prst="rect">
+            <a:avLst/>
+          </a:prstGeom>
+          <a:noFill/>
+        </p:spPr>
+        <p:txBody>
+          <a:bodyPr wrap="square" rtlCol="0">
+            <a:spAutoFit/>
+          </a:bodyPr>
+          <a:lstStyle/>
+          <a:p>
+            <a:r>
+              <a:rPr lang="en-US" altLang="zh-CN" sz="1200" dirty="0">
+                <a:solidFill>
+                  <a:srgbClr val="404040"/>
+                </a:solidFill>
+                <a:latin typeface="Arial" panose="020B0604020202020204" pitchFamily="34" charset="0"/>
+                <a:cs typeface="Arial" panose="020B0604020202020204" pitchFamily="34" charset="0"/>
+              </a:rPr>
+              <a:t>Date</a:t>
+            </a:r>
+            <a:endParaRPr lang="zh-CN" altLang="en-US" sz="1400" dirty="0">
+              <a:solidFill>
+                <a:srgbClr val="404040"/>
+              </a:solidFill>
+              <a:latin typeface="Arial" panose="020B0604020202020204" pitchFamily="34" charset="0"/>
+              <a:cs typeface="Arial" panose="020B0604020202020204" pitchFamily="34" charset="0"/>
+            </a:endParaRPr>
+          </a:p>
+        </p:txBody>
+      </p:sp>
+      <p:sp>
+        <p:nvSpPr>
+          <p:cNvPr id="48" name="文本框 47">
+            <a:extLst>
+              <a:ext uri="{FF2B5EF4-FFF2-40B4-BE49-F238E27FC236}">
+                <a16:creationId xmlns:a16="http://schemas.microsoft.com/office/drawing/2014/main" id="{1513ABC8-8C95-6E40-AA39-B813E3C9671E}"/>
+              </a:ext>
+            </a:extLst>
+          </p:cNvPr>
+          <p:cNvSpPr txBox="1"/>
+          <p:nvPr/>
+        </p:nvSpPr>
+        <p:spPr>
+          <a:xfrm>
+            <a:off x="8759028" y="911753"/>
+            <a:ext cx="1830289" cy="307777"/>
+          </a:xfrm>
+          <a:prstGeom prst="rect">
+            <a:avLst/>
+          </a:prstGeom>
+          <a:noFill/>
+        </p:spPr>
+        <p:txBody>
+          <a:bodyPr wrap="square" rtlCol="0">
+            <a:spAutoFit/>
+          </a:bodyPr>
+          <a:lstStyle/>
+          <a:p>
+            <a:r>
+              <a:rPr lang="en-US" altLang="zh-CN" sz="1400" b="1" dirty="0">
+                <a:latin typeface="Arial" panose="020B0604020202020204" pitchFamily="34" charset="0"/>
+                <a:cs typeface="Arial" panose="020B0604020202020204" pitchFamily="34" charset="0"/>
+              </a:rPr>
+              <a:t>Jack</a:t>
+            </a:r>
+            <a:endParaRPr lang="zh-CN" altLang="en-US" sz="1600" b="1" dirty="0">
+              <a:latin typeface="Arial" panose="020B0604020202020204" pitchFamily="34" charset="0"/>
+              <a:cs typeface="Arial" panose="020B0604020202020204" pitchFamily="34" charset="0"/>
+            </a:endParaRPr>
+          </a:p>
+        </p:txBody>
+      </p:sp>
+      <p:sp>
+        <p:nvSpPr>
+          <p:cNvPr id="49" name="文本框 48">
+            <a:extLst>
+              <a:ext uri="{FF2B5EF4-FFF2-40B4-BE49-F238E27FC236}">
+                <a16:creationId xmlns:a16="http://schemas.microsoft.com/office/drawing/2014/main" id="{E46A07A2-DA54-02BA-8BD3-02B4A9C9BE59}"/>
+              </a:ext>
+            </a:extLst>
+          </p:cNvPr>
+          <p:cNvSpPr txBox="1"/>
+          <p:nvPr/>
+        </p:nvSpPr>
+        <p:spPr>
+          <a:xfrm>
+            <a:off x="8759027" y="1314135"/>
+            <a:ext cx="1830289" cy="307777"/>
+          </a:xfrm>
+          <a:prstGeom prst="rect">
+            <a:avLst/>
+          </a:prstGeom>
+          <a:noFill/>
+        </p:spPr>
+        <p:txBody>
+          <a:bodyPr wrap="square" rtlCol="0">
+            <a:spAutoFit/>
+          </a:bodyPr>
+          <a:lstStyle/>
+          <a:p>
+            <a:r>
+              <a:rPr lang="en-US" altLang="zh-CN" sz="1400" b="1" dirty="0">
+                <a:latin typeface="Arial" panose="020B0604020202020204" pitchFamily="34" charset="0"/>
+                <a:cs typeface="Arial" panose="020B0604020202020204" pitchFamily="34" charset="0"/>
+              </a:rPr>
+              <a:t>2022/5/19</a:t>
+            </a:r>
+            <a:endParaRPr lang="zh-CN" altLang="en-US" sz="1600" b="1" dirty="0">
+              <a:latin typeface="Arial" panose="020B0604020202020204" pitchFamily="34" charset="0"/>
+              <a:cs typeface="Arial" panose="020B0604020202020204" pitchFamily="34" charset="0"/>
+            </a:endParaRPr>
+          </a:p>
+        </p:txBody>
+      </p:sp>
+      <p:sp>
+        <p:nvSpPr>
+          <p:cNvPr id="50" name="文本框 49">
+            <a:extLst>
+              <a:ext uri="{FF2B5EF4-FFF2-40B4-BE49-F238E27FC236}">
+                <a16:creationId xmlns:a16="http://schemas.microsoft.com/office/drawing/2014/main" id="{9F0C8C22-6AA1-151E-4B6B-264E20E1F7A2}"/>
+              </a:ext>
+            </a:extLst>
+          </p:cNvPr>
+          <p:cNvSpPr txBox="1"/>
+          <p:nvPr/>
+        </p:nvSpPr>
+        <p:spPr>
+          <a:xfrm>
+            <a:off x="8759027" y="1730775"/>
+            <a:ext cx="613265" cy="276999"/>
+          </a:xfrm>
+          <a:prstGeom prst="rect">
+            <a:avLst/>
+          </a:prstGeom>
+          <a:noFill/>
+        </p:spPr>
+        <p:txBody>
+          <a:bodyPr wrap="square" rtlCol="0">
+            <a:spAutoFit/>
+          </a:bodyPr>
+          <a:lstStyle/>
+          <a:p>
+            <a:r>
+              <a:rPr lang="en-US" altLang="zh-CN" sz="1200" dirty="0">
+                <a:solidFill>
+                  <a:srgbClr val="404040"/>
+                </a:solidFill>
+                <a:latin typeface="Arial" panose="020B0604020202020204" pitchFamily="34" charset="0"/>
+                <a:cs typeface="Arial" panose="020B0604020202020204" pitchFamily="34" charset="0"/>
+              </a:rPr>
+              <a:t>from</a:t>
+            </a:r>
+            <a:endParaRPr lang="zh-CN" altLang="en-US" sz="1200" dirty="0">
+              <a:solidFill>
+                <a:srgbClr val="404040"/>
+              </a:solidFill>
+              <a:latin typeface="Arial" panose="020B0604020202020204" pitchFamily="34" charset="0"/>
+              <a:cs typeface="Arial" panose="020B0604020202020204" pitchFamily="34" charset="0"/>
+            </a:endParaRPr>
+          </a:p>
+        </p:txBody>
+      </p:sp>
+      <p:sp>
+        <p:nvSpPr>
+          <p:cNvPr id="51" name="文本框 50">
+            <a:extLst>
+              <a:ext uri="{FF2B5EF4-FFF2-40B4-BE49-F238E27FC236}">
+                <a16:creationId xmlns:a16="http://schemas.microsoft.com/office/drawing/2014/main" id="{BE27A6F5-3B21-FA3E-0F10-48704B20BA79}"/>
+              </a:ext>
+            </a:extLst>
+          </p:cNvPr>
+          <p:cNvSpPr txBox="1"/>
+          <p:nvPr/>
+        </p:nvSpPr>
+        <p:spPr>
+          <a:xfrm>
+            <a:off x="9210550" y="1716524"/>
+            <a:ext cx="1830289" cy="523220"/>
+          </a:xfrm>
+          <a:prstGeom prst="rect">
+            <a:avLst/>
+          </a:prstGeom>
+          <a:noFill/>
+        </p:spPr>
+        <p:txBody>
+          <a:bodyPr wrap="square" rtlCol="0">
+            <a:spAutoFit/>
+          </a:bodyPr>
+          <a:lstStyle/>
+          <a:p>
+            <a:r>
+              <a:rPr lang="en-US" altLang="zh-CN" sz="1400" b="1" dirty="0">
+                <a:latin typeface="Arial" panose="020B0604020202020204" pitchFamily="34" charset="0"/>
+                <a:cs typeface="Arial" panose="020B0604020202020204" pitchFamily="34" charset="0"/>
+              </a:rPr>
+              <a:t>New York</a:t>
+            </a:r>
+          </a:p>
+          <a:p>
+            <a:r>
+              <a:rPr lang="en-US" altLang="zh-CN" sz="1400" b="1" dirty="0">
+                <a:latin typeface="Arial" panose="020B0604020202020204" pitchFamily="34" charset="0"/>
+                <a:cs typeface="Arial" panose="020B0604020202020204" pitchFamily="34" charset="0"/>
+              </a:rPr>
+              <a:t>05:50</a:t>
+            </a:r>
+          </a:p>
+        </p:txBody>
+      </p:sp>
+      <p:sp>
+        <p:nvSpPr>
+          <p:cNvPr id="52" name="文本框 51">
+            <a:extLst>
+              <a:ext uri="{FF2B5EF4-FFF2-40B4-BE49-F238E27FC236}">
+                <a16:creationId xmlns:a16="http://schemas.microsoft.com/office/drawing/2014/main" id="{0E01B530-2EC7-5B77-24C4-75A8E3E994D3}"/>
+              </a:ext>
+            </a:extLst>
+          </p:cNvPr>
+          <p:cNvSpPr txBox="1"/>
+          <p:nvPr/>
+        </p:nvSpPr>
+        <p:spPr>
+          <a:xfrm>
+            <a:off x="8759027" y="2157424"/>
+            <a:ext cx="396240" cy="276999"/>
+          </a:xfrm>
+          <a:prstGeom prst="rect">
+            <a:avLst/>
+          </a:prstGeom>
+          <a:noFill/>
+        </p:spPr>
+        <p:txBody>
+          <a:bodyPr wrap="square" rtlCol="0">
+            <a:spAutoFit/>
+          </a:bodyPr>
+          <a:lstStyle/>
+          <a:p>
+            <a:r>
+              <a:rPr lang="en-US" altLang="zh-CN" sz="1200" dirty="0">
+                <a:solidFill>
+                  <a:srgbClr val="404040"/>
+                </a:solidFill>
+                <a:latin typeface="Arial" panose="020B0604020202020204" pitchFamily="34" charset="0"/>
+                <a:cs typeface="Arial" panose="020B0604020202020204" pitchFamily="34" charset="0"/>
+              </a:rPr>
+              <a:t>to</a:t>
+            </a:r>
+            <a:endParaRPr lang="zh-CN" altLang="en-US" sz="1200" dirty="0">
+              <a:solidFill>
+                <a:srgbClr val="404040"/>
+              </a:solidFill>
+              <a:latin typeface="Arial" panose="020B0604020202020204" pitchFamily="34" charset="0"/>
+              <a:cs typeface="Arial" panose="020B0604020202020204" pitchFamily="34" charset="0"/>
+            </a:endParaRPr>
+          </a:p>
+        </p:txBody>
+      </p:sp>
+      <p:sp>
+        <p:nvSpPr>
+          <p:cNvPr id="53" name="文本框 52">
+            <a:extLst>
+              <a:ext uri="{FF2B5EF4-FFF2-40B4-BE49-F238E27FC236}">
+                <a16:creationId xmlns:a16="http://schemas.microsoft.com/office/drawing/2014/main" id="{6F5E0911-0AA6-6F27-EC17-0DECD2A2DD89}"/>
+              </a:ext>
+            </a:extLst>
+          </p:cNvPr>
+          <p:cNvSpPr txBox="1"/>
+          <p:nvPr/>
+        </p:nvSpPr>
+        <p:spPr>
+          <a:xfrm>
+            <a:off x="9210550" y="2132872"/>
+            <a:ext cx="1830289" cy="523220"/>
+          </a:xfrm>
+          <a:prstGeom prst="rect">
+            <a:avLst/>
+          </a:prstGeom>
+          <a:noFill/>
+        </p:spPr>
+        <p:txBody>
+          <a:bodyPr wrap="square" rtlCol="0">
+            <a:spAutoFit/>
+          </a:bodyPr>
+          <a:lstStyle/>
+          <a:p>
+            <a:r>
+              <a:rPr lang="en-US" altLang="zh-CN" sz="1400" b="1" dirty="0">
+                <a:latin typeface="Arial" panose="020B0604020202020204" pitchFamily="34" charset="0"/>
+                <a:cs typeface="Arial" panose="020B0604020202020204" pitchFamily="34" charset="0"/>
+              </a:rPr>
+              <a:t>Guangzhou</a:t>
+            </a:r>
+          </a:p>
+          <a:p>
+            <a:r>
+              <a:rPr lang="en-US" altLang="zh-CN" sz="1400" b="1" dirty="0">
+                <a:latin typeface="Arial" panose="020B0604020202020204" pitchFamily="34" charset="0"/>
+                <a:cs typeface="Arial" panose="020B0604020202020204" pitchFamily="34" charset="0"/>
+              </a:rPr>
+              <a:t>17:50</a:t>
+            </a:r>
+          </a:p>
+        </p:txBody>
+      </p:sp>
+      <p:sp>
+        <p:nvSpPr>
+          <p:cNvPr id="54" name="文本框 53">
+            <a:extLst>
+              <a:ext uri="{FF2B5EF4-FFF2-40B4-BE49-F238E27FC236}">
+                <a16:creationId xmlns:a16="http://schemas.microsoft.com/office/drawing/2014/main" id="{750B1EF5-A233-0B1C-CFE9-C2EE67587A0B}"/>
+              </a:ext>
+            </a:extLst>
+          </p:cNvPr>
+          <p:cNvSpPr txBox="1"/>
+          <p:nvPr/>
+        </p:nvSpPr>
+        <p:spPr>
+          <a:xfrm>
+            <a:off x="9210549" y="2851231"/>
+            <a:ext cx="1534402" cy="276999"/>
+          </a:xfrm>
+          <a:prstGeom prst="rect">
+            <a:avLst/>
+          </a:prstGeom>
+          <a:noFill/>
+        </p:spPr>
+        <p:txBody>
+          <a:bodyPr wrap="square" rtlCol="0">
+            <a:spAutoFit/>
+          </a:bodyPr>
+          <a:lstStyle/>
+          <a:p>
+            <a:r>
+              <a:rPr lang="en-US" altLang="zh-CN" sz="1200" dirty="0">
+                <a:solidFill>
+                  <a:srgbClr val="404040"/>
+                </a:solidFill>
+                <a:latin typeface="Arial" panose="020B0604020202020204" pitchFamily="34" charset="0"/>
+                <a:cs typeface="Arial" panose="020B0604020202020204" pitchFamily="34" charset="0"/>
+              </a:rPr>
+              <a:t>Seat</a:t>
+            </a:r>
+            <a:endParaRPr lang="zh-CN" altLang="en-US" sz="1200" dirty="0">
+              <a:solidFill>
+                <a:srgbClr val="404040"/>
+              </a:solidFill>
+              <a:latin typeface="Arial" panose="020B0604020202020204" pitchFamily="34" charset="0"/>
+              <a:cs typeface="Arial" panose="020B0604020202020204" pitchFamily="34" charset="0"/>
+            </a:endParaRPr>
+          </a:p>
+        </p:txBody>
+      </p:sp>
+      <p:sp>
+        <p:nvSpPr>
+          <p:cNvPr id="55" name="文本框 54">
+            <a:extLst>
+              <a:ext uri="{FF2B5EF4-FFF2-40B4-BE49-F238E27FC236}">
+                <a16:creationId xmlns:a16="http://schemas.microsoft.com/office/drawing/2014/main" id="{A9D2A82B-AD9C-7CAE-D238-6CEB739B45B5}"/>
+              </a:ext>
+            </a:extLst>
+          </p:cNvPr>
+          <p:cNvSpPr txBox="1"/>
+          <p:nvPr/>
+        </p:nvSpPr>
+        <p:spPr>
+          <a:xfrm>
+            <a:off x="9220769" y="2608446"/>
+            <a:ext cx="756981" cy="400110"/>
+          </a:xfrm>
+          <a:prstGeom prst="rect">
+            <a:avLst/>
+          </a:prstGeom>
+          <a:noFill/>
+        </p:spPr>
+        <p:txBody>
+          <a:bodyPr wrap="square" rtlCol="0">
+            <a:spAutoFit/>
+          </a:bodyPr>
+          <a:lstStyle/>
+          <a:p>
+            <a:r>
+              <a:rPr lang="en-US" altLang="zh-CN" sz="2000" b="1" dirty="0">
+                <a:solidFill>
+                  <a:srgbClr val="1C1C1C"/>
+                </a:solidFill>
+                <a:latin typeface="Arial" panose="020B0604020202020204" pitchFamily="34" charset="0"/>
+                <a:cs typeface="Arial" panose="020B0604020202020204" pitchFamily="34" charset="0"/>
+              </a:rPr>
+              <a:t>20A</a:t>
+            </a:r>
+            <a:endParaRPr lang="zh-CN" altLang="en-US" sz="2000" b="1" dirty="0">
+              <a:solidFill>
+                <a:srgbClr val="1C1C1C"/>
+              </a:solidFill>
+              <a:latin typeface="Arial" panose="020B0604020202020204" pitchFamily="34" charset="0"/>
+              <a:cs typeface="Arial" panose="020B0604020202020204" pitchFamily="34" charset="0"/>
+            </a:endParaRPr>
+          </a:p>
+        </p:txBody>
+      </p:sp>
+    </p:spTree>
+    <p:extLst>
+      <p:ext uri="{BB962C8B-B14F-4D97-AF65-F5344CB8AC3E}">
+        <p14:creationId xmlns:p14="http://schemas.microsoft.com/office/powerpoint/2010/main" val="2069409737"/>
+      </p:ext>
+    </p:extLst>
+  </p:cSld>
+  <p:clrMapOvr>
+    <a:masterClrMapping/>
+  </p:clrMapOvr>
+</p:sld>
+</file>
+
+<file path=ppt/slides/slide3.xml><?xml version="1.0" encoding="utf-8"?>
+<p:sld xmlns:a="http://schemas.openxmlformats.org/drawingml/2006/main" xmlns:r="http://schemas.openxmlformats.org/officeDocument/2006/relationships" xmlns:p="http://schemas.openxmlformats.org/presentationml/2006/main">
+  <p:cSld>
+    <p:bg>
+      <p:bgPr>
+        <a:solidFill>
+          <a:schemeClr val="tx1">
+            <a:lumMod val="95000"/>
+            <a:lumOff val="5000"/>
+          </a:schemeClr>
+        </a:solidFill>
+        <a:effectLst/>
+      </p:bgPr>
+    </p:bg>
+    <p:spTree>
+      <p:nvGrpSpPr>
+        <p:cNvPr id="1" name=""/>
+        <p:cNvGrpSpPr/>
+        <p:nvPr/>
+      </p:nvGrpSpPr>
+      <p:grpSpPr>
+        <a:xfrm>
+          <a:off x="0" y="0"/>
+          <a:ext cx="0" cy="0"/>
+          <a:chOff x="0" y="0"/>
+          <a:chExt cx="0" cy="0"/>
+        </a:xfrm>
+      </p:grpSpPr>
+      <p:pic>
+        <p:nvPicPr>
+          <p:cNvPr id="6" name="图片 5" descr="图示&#10;&#10;低可信度描述已自动生成">
+            <a:extLst>
+              <a:ext uri="{FF2B5EF4-FFF2-40B4-BE49-F238E27FC236}">
+                <a16:creationId xmlns:a16="http://schemas.microsoft.com/office/drawing/2014/main" id="{9AA561A5-E291-A813-E64A-8C880098515D}"/>
+              </a:ext>
+            </a:extLst>
+          </p:cNvPr>
+          <p:cNvPicPr>
+            <a:picLocks noChangeAspect="1"/>
+          </p:cNvPicPr>
+          <p:nvPr/>
+        </p:nvPicPr>
+        <p:blipFill rotWithShape="1">
+          <a:blip r:embed="rId2">
+            <a:extLst>
+              <a:ext uri="{28A0092B-C50C-407E-A947-70E740481C1C}">
+                <a14:useLocalDpi xmlns:a14="http://schemas.microsoft.com/office/drawing/2010/main" val="0"/>
+              </a:ext>
+            </a:extLst>
+          </a:blip>
+          <a:srcRect l="259" t="1301" r="163" b="541"/>
+          <a:stretch/>
+        </p:blipFill>
+        <p:spPr>
+          <a:xfrm>
+            <a:off x="704597" y="3454171"/>
+            <a:ext cx="10375804" cy="2779233"/>
+          </a:xfrm>
+          <a:prstGeom prst="rect">
+            <a:avLst/>
+          </a:prstGeom>
+        </p:spPr>
+      </p:pic>
+      <p:grpSp>
+        <p:nvGrpSpPr>
+          <p:cNvPr id="2" name="组合 1">
+            <a:extLst>
+              <a:ext uri="{FF2B5EF4-FFF2-40B4-BE49-F238E27FC236}">
+                <a16:creationId xmlns:a16="http://schemas.microsoft.com/office/drawing/2014/main" id="{5106D8C4-E3CF-DA2B-5F67-DF4F8C991F2D}"/>
+              </a:ext>
+            </a:extLst>
+          </p:cNvPr>
+          <p:cNvGrpSpPr/>
+          <p:nvPr/>
+        </p:nvGrpSpPr>
+        <p:grpSpPr>
+          <a:xfrm>
+            <a:off x="704597" y="401992"/>
+            <a:ext cx="10412887" cy="2803862"/>
+            <a:chOff x="704597" y="401992"/>
+            <a:chExt cx="10412887" cy="2803862"/>
+          </a:xfrm>
+        </p:grpSpPr>
+        <p:grpSp>
+          <p:nvGrpSpPr>
+            <p:cNvPr id="15" name="组合 14">
+              <a:extLst>
+                <a:ext uri="{FF2B5EF4-FFF2-40B4-BE49-F238E27FC236}">
+                  <a16:creationId xmlns:a16="http://schemas.microsoft.com/office/drawing/2014/main" id="{01E231AF-2C56-F386-5FC8-2FB4B31E1543}"/>
+                </a:ext>
+              </a:extLst>
+            </p:cNvPr>
+            <p:cNvGrpSpPr/>
+            <p:nvPr/>
+          </p:nvGrpSpPr>
+          <p:grpSpPr>
+            <a:xfrm>
+              <a:off x="704597" y="401992"/>
+              <a:ext cx="10412887" cy="2803862"/>
+              <a:chOff x="704597" y="401992"/>
+              <a:chExt cx="10412887" cy="2803862"/>
+            </a:xfrm>
+          </p:grpSpPr>
+          <p:grpSp>
+            <p:nvGrpSpPr>
+              <p:cNvPr id="9" name="组合 8">
+                <a:extLst>
+                  <a:ext uri="{FF2B5EF4-FFF2-40B4-BE49-F238E27FC236}">
+                    <a16:creationId xmlns:a16="http://schemas.microsoft.com/office/drawing/2014/main" id="{83E73258-7210-33A4-6CC3-7C5D73379845}"/>
+                  </a:ext>
+                </a:extLst>
+              </p:cNvPr>
+              <p:cNvGrpSpPr/>
+              <p:nvPr/>
+            </p:nvGrpSpPr>
+            <p:grpSpPr>
+              <a:xfrm>
+                <a:off x="704597" y="401992"/>
+                <a:ext cx="10412887" cy="2803862"/>
+                <a:chOff x="704597" y="401992"/>
+                <a:chExt cx="10412887" cy="2803862"/>
+              </a:xfrm>
+            </p:grpSpPr>
+            <p:sp>
+              <p:nvSpPr>
+                <p:cNvPr id="4" name="矩形: 圆角 3">
+                  <a:extLst>
+                    <a:ext uri="{FF2B5EF4-FFF2-40B4-BE49-F238E27FC236}">
+                      <a16:creationId xmlns:a16="http://schemas.microsoft.com/office/drawing/2014/main" id="{A8CA2ADD-6D7D-8C0B-C138-F92D277447CC}"/>
+                    </a:ext>
+                  </a:extLst>
+                </p:cNvPr>
+                <p:cNvSpPr>
+                  <a:spLocks noChangeAspect="1"/>
+                </p:cNvSpPr>
+                <p:nvPr/>
+              </p:nvSpPr>
+              <p:spPr>
+                <a:xfrm>
+                  <a:off x="704597" y="416688"/>
+                  <a:ext cx="10412887" cy="2789166"/>
+                </a:xfrm>
+                <a:prstGeom prst="roundRect">
+                  <a:avLst>
+                    <a:gd name="adj" fmla="val 8289"/>
+                  </a:avLst>
+                </a:prstGeom>
+                <a:solidFill>
+                  <a:srgbClr val="C03030"/>
+                </a:solidFill>
+                <a:ln>
+                  <a:noFill/>
+                </a:ln>
+              </p:spPr>
+              <p:style>
+                <a:lnRef idx="2">
+                  <a:schemeClr val="accent1">
+                    <a:shade val="50000"/>
+                  </a:schemeClr>
+                </a:lnRef>
+                <a:fillRef idx="1">
+                  <a:schemeClr val="accent1"/>
+                </a:fillRef>
+                <a:effectRef idx="0">
+                  <a:schemeClr val="accent1"/>
+                </a:effectRef>
+                <a:fontRef idx="minor">
+                  <a:schemeClr val="lt1"/>
+                </a:fontRef>
+              </p:style>
+              <p:txBody>
+                <a:bodyPr rtlCol="0" anchor="ctr"/>
+                <a:lstStyle/>
+                <a:p>
+                  <a:pPr marL="0" marR="0" lvl="0" indent="0" algn="ctr" defTabSz="914400" rtl="0" eaLnBrk="1" fontAlgn="auto" latinLnBrk="0" hangingPunct="1">
+                    <a:lnSpc>
+                      <a:spcPct val="100000"/>
+                    </a:lnSpc>
+                    <a:spcBef>
+                      <a:spcPts val="0"/>
+                    </a:spcBef>
+                    <a:spcAft>
+                      <a:spcPts val="0"/>
+                    </a:spcAft>
+                    <a:buClrTx/>
+                    <a:buSzTx/>
+                    <a:buFontTx/>
+                    <a:buNone/>
+                    <a:tabLst/>
+                    <a:defRPr/>
+                  </a:pPr>
+                  <a:endParaRPr kumimoji="0" lang="zh-CN" altLang="en-US" sz="1800" b="0" i="0" u="none" strike="noStrike" kern="1200" cap="none" spc="0" normalizeH="0" baseline="-25000" noProof="0" dirty="0">
+                    <a:ln>
+                      <a:noFill/>
+                    </a:ln>
+                    <a:noFill/>
+                    <a:effectLst/>
+                    <a:uLnTx/>
+                    <a:uFillTx/>
+                    <a:latin typeface="等线" panose="020F0502020204030204"/>
+                    <a:ea typeface="等线" panose="02010600030101010101" pitchFamily="2" charset="-122"/>
+                    <a:cs typeface="+mn-cs"/>
+                  </a:endParaRPr>
+                </a:p>
+              </p:txBody>
+            </p:sp>
+            <p:sp>
+              <p:nvSpPr>
+                <p:cNvPr id="7" name="矩形: 圆角 6">
+                  <a:extLst>
+                    <a:ext uri="{FF2B5EF4-FFF2-40B4-BE49-F238E27FC236}">
+                      <a16:creationId xmlns:a16="http://schemas.microsoft.com/office/drawing/2014/main" id="{58CB71FB-59CC-0030-F7BD-42A05E311CEF}"/>
+                    </a:ext>
+                  </a:extLst>
+                </p:cNvPr>
+                <p:cNvSpPr>
+                  <a:spLocks noChangeAspect="1"/>
+                </p:cNvSpPr>
+                <p:nvPr/>
+              </p:nvSpPr>
+              <p:spPr>
+                <a:xfrm>
+                  <a:off x="704597" y="852676"/>
+                  <a:ext cx="10412886" cy="2353178"/>
+                </a:xfrm>
+                <a:prstGeom prst="roundRect">
+                  <a:avLst>
+                    <a:gd name="adj" fmla="val 8289"/>
+                  </a:avLst>
+                </a:prstGeom>
+                <a:solidFill>
+                  <a:schemeClr val="bg1"/>
+                </a:solidFill>
+                <a:ln>
+                  <a:noFill/>
+                </a:ln>
+                <a:effectLst>
+                  <a:outerShdw blurRad="50800" dist="63500" dir="16200000" rotWithShape="0">
+                    <a:prstClr val="black">
+                      <a:alpha val="15000"/>
+                    </a:prstClr>
+                  </a:outerShdw>
+                </a:effectLst>
+              </p:spPr>
+              <p:style>
+                <a:lnRef idx="2">
+                  <a:schemeClr val="accent1">
+                    <a:shade val="50000"/>
+                  </a:schemeClr>
+                </a:lnRef>
+                <a:fillRef idx="1">
+                  <a:schemeClr val="accent1"/>
+                </a:fillRef>
+                <a:effectRef idx="0">
+                  <a:schemeClr val="accent1"/>
+                </a:effectRef>
+                <a:fontRef idx="minor">
+                  <a:schemeClr val="lt1"/>
+                </a:fontRef>
+              </p:style>
+              <p:txBody>
+                <a:bodyPr rtlCol="0" anchor="ctr"/>
+                <a:lstStyle/>
+                <a:p>
+                  <a:pPr marL="0" marR="0" lvl="0" indent="0" algn="ctr" defTabSz="914400" rtl="0" eaLnBrk="1" fontAlgn="auto" latinLnBrk="0" hangingPunct="1">
+                    <a:lnSpc>
+                      <a:spcPct val="100000"/>
+                    </a:lnSpc>
+                    <a:spcBef>
+                      <a:spcPts val="0"/>
+                    </a:spcBef>
+                    <a:spcAft>
+                      <a:spcPts val="0"/>
+                    </a:spcAft>
+                    <a:buClrTx/>
+                    <a:buSzTx/>
+                    <a:buFontTx/>
+                    <a:buNone/>
+                    <a:tabLst/>
+                    <a:defRPr/>
+                  </a:pPr>
+                  <a:endParaRPr kumimoji="0" lang="zh-CN" altLang="en-US" sz="1800" b="0" i="0" u="none" strike="noStrike" kern="1200" cap="none" spc="0" normalizeH="0" baseline="-25000" noProof="0" dirty="0">
+                    <a:ln>
+                      <a:noFill/>
+                    </a:ln>
+                    <a:noFill/>
+                    <a:effectLst/>
+                    <a:uLnTx/>
+                    <a:uFillTx/>
+                    <a:latin typeface="等线" panose="020F0502020204030204"/>
+                    <a:ea typeface="等线" panose="02010600030101010101" pitchFamily="2" charset="-122"/>
+                    <a:cs typeface="+mn-cs"/>
+                  </a:endParaRPr>
+                </a:p>
+              </p:txBody>
+            </p:sp>
+            <p:sp>
+              <p:nvSpPr>
+                <p:cNvPr id="8" name="文本框 7">
+                  <a:extLst>
+                    <a:ext uri="{FF2B5EF4-FFF2-40B4-BE49-F238E27FC236}">
+                      <a16:creationId xmlns:a16="http://schemas.microsoft.com/office/drawing/2014/main" id="{7496C451-1A5D-3E6C-7E72-C0DBA4ED1692}"/>
+                    </a:ext>
+                  </a:extLst>
+                </p:cNvPr>
+                <p:cNvSpPr txBox="1"/>
+                <p:nvPr/>
+              </p:nvSpPr>
+              <p:spPr>
+                <a:xfrm>
+                  <a:off x="1066379" y="401992"/>
+                  <a:ext cx="1993803" cy="338554"/>
+                </a:xfrm>
+                <a:prstGeom prst="rect">
+                  <a:avLst/>
+                </a:prstGeom>
+                <a:noFill/>
+              </p:spPr>
+              <p:txBody>
+                <a:bodyPr wrap="square" rtlCol="0">
+                  <a:spAutoFit/>
+                </a:bodyPr>
+                <a:lstStyle/>
+                <a:p>
+                  <a:pPr marL="0" marR="0" lvl="0" indent="0" algn="l" defTabSz="914400" rtl="0" eaLnBrk="1" fontAlgn="auto" latinLnBrk="0" hangingPunct="1">
+                    <a:lnSpc>
+                      <a:spcPct val="100000"/>
+                    </a:lnSpc>
+                    <a:spcBef>
+                      <a:spcPts val="0"/>
+                    </a:spcBef>
+                    <a:spcAft>
+                      <a:spcPts val="0"/>
+                    </a:spcAft>
+                    <a:buClrTx/>
+                    <a:buSzTx/>
+                    <a:buFontTx/>
+                    <a:buNone/>
+                    <a:tabLst/>
+                    <a:defRPr/>
+                  </a:pPr>
+                  <a:r>
+                    <a:rPr kumimoji="0" lang="en-US" altLang="zh-CN" sz="2400" b="0" i="0" u="none" strike="noStrike" kern="1200" cap="none" spc="0" normalizeH="0" baseline="-25000" noProof="0" dirty="0">
+                      <a:ln>
+                        <a:noFill/>
+                      </a:ln>
+                      <a:solidFill>
+                        <a:prstClr val="white"/>
+                      </a:solidFill>
+                      <a:effectLst/>
+                      <a:uLnTx/>
+                      <a:uFillTx/>
+                      <a:latin typeface="Arial" panose="020B0604020202020204" pitchFamily="34" charset="0"/>
+                      <a:ea typeface="等线" panose="02010600030101010101" pitchFamily="2" charset="-122"/>
+                      <a:cs typeface="Arial" panose="020B0604020202020204" pitchFamily="34" charset="0"/>
+                    </a:rPr>
+                    <a:t>BOARDING PASS</a:t>
+                  </a:r>
+                  <a:endParaRPr kumimoji="0" lang="zh-CN" altLang="en-US" sz="2400" b="0" i="0" u="none" strike="noStrike" kern="1200" cap="none" spc="0" normalizeH="0" baseline="-25000" noProof="0" dirty="0">
+                    <a:ln>
+                      <a:noFill/>
+                    </a:ln>
+                    <a:solidFill>
+                      <a:prstClr val="white"/>
+                    </a:solidFill>
+                    <a:effectLst/>
+                    <a:uLnTx/>
+                    <a:uFillTx/>
+                    <a:latin typeface="Arial" panose="020B0604020202020204" pitchFamily="34" charset="0"/>
+                    <a:ea typeface="等线" panose="02010600030101010101" pitchFamily="2" charset="-122"/>
+                    <a:cs typeface="Arial" panose="020B0604020202020204" pitchFamily="34" charset="0"/>
+                  </a:endParaRPr>
+                </a:p>
+              </p:txBody>
+            </p:sp>
+          </p:grpSp>
+          <p:cxnSp>
+            <p:nvCxnSpPr>
+              <p:cNvPr id="11" name="直接连接符 10">
+                <a:extLst>
+                  <a:ext uri="{FF2B5EF4-FFF2-40B4-BE49-F238E27FC236}">
+                    <a16:creationId xmlns:a16="http://schemas.microsoft.com/office/drawing/2014/main" id="{BD9AE80C-2AFD-8390-1EAA-C4E5494E8F19}"/>
+                  </a:ext>
+                </a:extLst>
+              </p:cNvPr>
+              <p:cNvCxnSpPr>
+                <a:cxnSpLocks/>
+              </p:cNvCxnSpPr>
+              <p:nvPr/>
+            </p:nvCxnSpPr>
+            <p:spPr>
+              <a:xfrm flipV="1">
+                <a:off x="8337550" y="406528"/>
+                <a:ext cx="0" cy="2748143"/>
+              </a:xfrm>
+              <a:prstGeom prst="line">
+                <a:avLst/>
+              </a:prstGeom>
+              <a:ln w="28575" cap="rnd" cmpd="sng" algn="ctr">
+                <a:solidFill>
+                  <a:schemeClr val="bg1">
+                    <a:lumMod val="85000"/>
+                    <a:alpha val="60000"/>
+                  </a:schemeClr>
+                </a:solidFill>
+                <a:prstDash val="dash"/>
+                <a:round/>
+                <a:headEnd type="none" w="med" len="med"/>
+                <a:tailEnd type="none" w="med" len="med"/>
+              </a:ln>
+            </p:spPr>
+            <p:style>
+              <a:lnRef idx="0">
+                <a:scrgbClr r="0" g="0" b="0"/>
+              </a:lnRef>
+              <a:fillRef idx="0">
+                <a:scrgbClr r="0" g="0" b="0"/>
+              </a:fillRef>
+              <a:effectRef idx="0">
+                <a:scrgbClr r="0" g="0" b="0"/>
+              </a:effectRef>
+              <a:fontRef idx="minor">
+                <a:schemeClr val="tx1"/>
+              </a:fontRef>
+            </p:style>
+          </p:cxnSp>
+        </p:grpSp>
+        <p:sp>
+          <p:nvSpPr>
+            <p:cNvPr id="16" name="文本框 15">
+              <a:extLst>
+                <a:ext uri="{FF2B5EF4-FFF2-40B4-BE49-F238E27FC236}">
+                  <a16:creationId xmlns:a16="http://schemas.microsoft.com/office/drawing/2014/main" id="{103C8B07-2465-F6A9-DE64-B1152898096E}"/>
+                </a:ext>
+              </a:extLst>
+            </p:cNvPr>
+            <p:cNvSpPr txBox="1"/>
+            <p:nvPr/>
+          </p:nvSpPr>
+          <p:spPr>
+            <a:xfrm>
+              <a:off x="1066380" y="1263821"/>
+              <a:ext cx="613265" cy="276999"/>
+            </a:xfrm>
+            <a:prstGeom prst="rect">
+              <a:avLst/>
+            </a:prstGeom>
+            <a:noFill/>
+          </p:spPr>
+          <p:txBody>
+            <a:bodyPr wrap="square" rtlCol="0">
+              <a:spAutoFit/>
+            </a:bodyPr>
+            <a:lstStyle/>
+            <a:p>
+              <a:pPr marL="0" marR="0" lvl="0" indent="0" algn="l" defTabSz="914400" rtl="0" eaLnBrk="1" fontAlgn="auto" latinLnBrk="0" hangingPunct="1">
+                <a:lnSpc>
+                  <a:spcPct val="100000"/>
+                </a:lnSpc>
+                <a:spcBef>
+                  <a:spcPts val="0"/>
+                </a:spcBef>
+                <a:spcAft>
+                  <a:spcPts val="0"/>
+                </a:spcAft>
+                <a:buClrTx/>
+                <a:buSzTx/>
+                <a:buFontTx/>
+                <a:buNone/>
+                <a:tabLst/>
+                <a:defRPr/>
+              </a:pPr>
+              <a:r>
+                <a:rPr kumimoji="0" lang="en-US" altLang="zh-CN" sz="1200" b="0" i="0" u="none" strike="noStrike" kern="1200" cap="none" spc="0" normalizeH="0" baseline="0" noProof="0" dirty="0">
+                  <a:ln>
+                    <a:noFill/>
+                  </a:ln>
+                  <a:solidFill>
+                    <a:srgbClr val="404040"/>
+                  </a:solidFill>
+                  <a:effectLst/>
+                  <a:uLnTx/>
+                  <a:uFillTx/>
+                  <a:latin typeface="Arial" panose="020B0604020202020204" pitchFamily="34" charset="0"/>
+                  <a:ea typeface="等线" panose="02010600030101010101" pitchFamily="2" charset="-122"/>
+                  <a:cs typeface="Arial" panose="020B0604020202020204" pitchFamily="34" charset="0"/>
+                </a:rPr>
+                <a:t>from</a:t>
+              </a:r>
+              <a:endParaRPr kumimoji="0" lang="zh-CN" altLang="en-US" sz="1200" b="0" i="0" u="none" strike="noStrike" kern="1200" cap="none" spc="0" normalizeH="0" baseline="0" noProof="0" dirty="0">
+                <a:ln>
+                  <a:noFill/>
+                </a:ln>
+                <a:solidFill>
+                  <a:srgbClr val="404040"/>
+                </a:solidFill>
+                <a:effectLst/>
+                <a:uLnTx/>
+                <a:uFillTx/>
+                <a:latin typeface="Arial" panose="020B0604020202020204" pitchFamily="34" charset="0"/>
+                <a:ea typeface="等线" panose="02010600030101010101" pitchFamily="2" charset="-122"/>
+                <a:cs typeface="Arial" panose="020B0604020202020204" pitchFamily="34" charset="0"/>
+              </a:endParaRPr>
+            </a:p>
+          </p:txBody>
+        </p:sp>
+        <p:sp>
+          <p:nvSpPr>
+            <p:cNvPr id="17" name="文本框 16">
+              <a:extLst>
+                <a:ext uri="{FF2B5EF4-FFF2-40B4-BE49-F238E27FC236}">
+                  <a16:creationId xmlns:a16="http://schemas.microsoft.com/office/drawing/2014/main" id="{0425DF65-6715-7A11-1A03-84323E8F6042}"/>
+                </a:ext>
+              </a:extLst>
+            </p:cNvPr>
+            <p:cNvSpPr txBox="1"/>
+            <p:nvPr/>
+          </p:nvSpPr>
+          <p:spPr>
+            <a:xfrm>
+              <a:off x="3329827" y="1263821"/>
+              <a:ext cx="396240" cy="276999"/>
+            </a:xfrm>
+            <a:prstGeom prst="rect">
+              <a:avLst/>
+            </a:prstGeom>
+            <a:noFill/>
+          </p:spPr>
+          <p:txBody>
+            <a:bodyPr wrap="square" rtlCol="0">
+              <a:spAutoFit/>
+            </a:bodyPr>
+            <a:lstStyle/>
+            <a:p>
+              <a:pPr marL="0" marR="0" lvl="0" indent="0" algn="l" defTabSz="914400" rtl="0" eaLnBrk="1" fontAlgn="auto" latinLnBrk="0" hangingPunct="1">
+                <a:lnSpc>
+                  <a:spcPct val="100000"/>
+                </a:lnSpc>
+                <a:spcBef>
+                  <a:spcPts val="0"/>
+                </a:spcBef>
+                <a:spcAft>
+                  <a:spcPts val="0"/>
+                </a:spcAft>
+                <a:buClrTx/>
+                <a:buSzTx/>
+                <a:buFontTx/>
+                <a:buNone/>
+                <a:tabLst/>
+                <a:defRPr/>
+              </a:pPr>
+              <a:r>
+                <a:rPr kumimoji="0" lang="en-US" altLang="zh-CN" sz="1200" b="0" i="0" u="none" strike="noStrike" kern="1200" cap="none" spc="0" normalizeH="0" baseline="0" noProof="0" dirty="0">
+                  <a:ln>
+                    <a:noFill/>
+                  </a:ln>
+                  <a:solidFill>
+                    <a:srgbClr val="404040"/>
+                  </a:solidFill>
+                  <a:effectLst/>
+                  <a:uLnTx/>
+                  <a:uFillTx/>
+                  <a:latin typeface="Arial" panose="020B0604020202020204" pitchFamily="34" charset="0"/>
+                  <a:ea typeface="等线" panose="02010600030101010101" pitchFamily="2" charset="-122"/>
+                  <a:cs typeface="Arial" panose="020B0604020202020204" pitchFamily="34" charset="0"/>
+                </a:rPr>
+                <a:t>to</a:t>
+              </a:r>
+              <a:endParaRPr kumimoji="0" lang="zh-CN" altLang="en-US" sz="1200" b="0" i="0" u="none" strike="noStrike" kern="1200" cap="none" spc="0" normalizeH="0" baseline="0" noProof="0" dirty="0">
+                <a:ln>
+                  <a:noFill/>
+                </a:ln>
+                <a:solidFill>
+                  <a:srgbClr val="404040"/>
+                </a:solidFill>
+                <a:effectLst/>
+                <a:uLnTx/>
+                <a:uFillTx/>
+                <a:latin typeface="Arial" panose="020B0604020202020204" pitchFamily="34" charset="0"/>
+                <a:ea typeface="等线" panose="02010600030101010101" pitchFamily="2" charset="-122"/>
+                <a:cs typeface="Arial" panose="020B0604020202020204" pitchFamily="34" charset="0"/>
+              </a:endParaRPr>
+            </a:p>
+          </p:txBody>
+        </p:sp>
+        <p:pic>
+          <p:nvPicPr>
+            <p:cNvPr id="23" name="图片 22" descr="形状, 箭头&#10;&#10;描述已自动生成">
+              <a:extLst>
+                <a:ext uri="{FF2B5EF4-FFF2-40B4-BE49-F238E27FC236}">
+                  <a16:creationId xmlns:a16="http://schemas.microsoft.com/office/drawing/2014/main" id="{38C42508-6C38-437F-01B5-77BC10FC45C2}"/>
+                </a:ext>
+              </a:extLst>
+            </p:cNvPr>
+            <p:cNvPicPr>
+              <a:picLocks noChangeAspect="1"/>
+            </p:cNvPicPr>
+            <p:nvPr/>
+          </p:nvPicPr>
+          <p:blipFill>
+            <a:blip r:embed="rId3">
+              <a:extLst>
+                <a:ext uri="{28A0092B-C50C-407E-A947-70E740481C1C}">
+                  <a14:useLocalDpi xmlns:a14="http://schemas.microsoft.com/office/drawing/2010/main" val="0"/>
+                </a:ext>
+              </a:extLst>
+            </a:blip>
+            <a:stretch>
+              <a:fillRect/>
+            </a:stretch>
+          </p:blipFill>
+          <p:spPr>
+            <a:xfrm>
+              <a:off x="2557703" y="987381"/>
+              <a:ext cx="606840" cy="435569"/>
+            </a:xfrm>
+            <a:prstGeom prst="rect">
+              <a:avLst/>
+            </a:prstGeom>
+          </p:spPr>
+        </p:pic>
+        <p:sp>
+          <p:nvSpPr>
+            <p:cNvPr id="28" name="文本框 27">
+              <a:extLst>
+                <a:ext uri="{FF2B5EF4-FFF2-40B4-BE49-F238E27FC236}">
+                  <a16:creationId xmlns:a16="http://schemas.microsoft.com/office/drawing/2014/main" id="{90C8E853-4C64-CCDB-D860-E630C526672B}"/>
+                </a:ext>
+              </a:extLst>
+            </p:cNvPr>
+            <p:cNvSpPr txBox="1"/>
+            <p:nvPr/>
+          </p:nvSpPr>
+          <p:spPr>
+            <a:xfrm>
+              <a:off x="1066380" y="1864036"/>
+              <a:ext cx="1534402" cy="276999"/>
+            </a:xfrm>
+            <a:prstGeom prst="rect">
+              <a:avLst/>
+            </a:prstGeom>
+            <a:noFill/>
+          </p:spPr>
+          <p:txBody>
+            <a:bodyPr wrap="square" rtlCol="0">
+              <a:spAutoFit/>
+            </a:bodyPr>
+            <a:lstStyle/>
+            <a:p>
+              <a:pPr marL="0" marR="0" lvl="0" indent="0" algn="l" defTabSz="914400" rtl="0" eaLnBrk="1" fontAlgn="auto" latinLnBrk="0" hangingPunct="1">
+                <a:lnSpc>
+                  <a:spcPct val="100000"/>
+                </a:lnSpc>
+                <a:spcBef>
+                  <a:spcPts val="0"/>
+                </a:spcBef>
+                <a:spcAft>
+                  <a:spcPts val="0"/>
+                </a:spcAft>
+                <a:buClrTx/>
+                <a:buSzTx/>
+                <a:buFontTx/>
+                <a:buNone/>
+                <a:tabLst/>
+                <a:defRPr/>
+              </a:pPr>
+              <a:r>
+                <a:rPr kumimoji="0" lang="en-US" altLang="zh-CN" sz="1200" b="0" i="0" u="none" strike="noStrike" kern="1200" cap="none" spc="0" normalizeH="0" baseline="0" noProof="0" dirty="0">
+                  <a:ln>
+                    <a:noFill/>
+                  </a:ln>
+                  <a:solidFill>
+                    <a:srgbClr val="404040"/>
+                  </a:solidFill>
+                  <a:effectLst/>
+                  <a:uLnTx/>
+                  <a:uFillTx/>
+                  <a:latin typeface="Arial" panose="020B0604020202020204" pitchFamily="34" charset="0"/>
+                  <a:ea typeface="等线" panose="02010600030101010101" pitchFamily="2" charset="-122"/>
+                  <a:cs typeface="Arial" panose="020B0604020202020204" pitchFamily="34" charset="0"/>
+                </a:rPr>
+                <a:t>Passenger name</a:t>
+              </a:r>
+              <a:endParaRPr kumimoji="0" lang="zh-CN" altLang="en-US" sz="1200" b="0" i="0" u="none" strike="noStrike" kern="1200" cap="none" spc="0" normalizeH="0" baseline="0" noProof="0" dirty="0">
+                <a:ln>
+                  <a:noFill/>
+                </a:ln>
+                <a:solidFill>
+                  <a:srgbClr val="404040"/>
+                </a:solidFill>
+                <a:effectLst/>
+                <a:uLnTx/>
+                <a:uFillTx/>
+                <a:latin typeface="Arial" panose="020B0604020202020204" pitchFamily="34" charset="0"/>
+                <a:ea typeface="等线" panose="02010600030101010101" pitchFamily="2" charset="-122"/>
+                <a:cs typeface="Arial" panose="020B0604020202020204" pitchFamily="34" charset="0"/>
+              </a:endParaRPr>
+            </a:p>
+          </p:txBody>
+        </p:sp>
+        <p:sp>
+          <p:nvSpPr>
+            <p:cNvPr id="29" name="文本框 28">
+              <a:extLst>
+                <a:ext uri="{FF2B5EF4-FFF2-40B4-BE49-F238E27FC236}">
+                  <a16:creationId xmlns:a16="http://schemas.microsoft.com/office/drawing/2014/main" id="{3F4378DE-B4FD-817E-3226-F2A96723B4BE}"/>
+                </a:ext>
+              </a:extLst>
+            </p:cNvPr>
+            <p:cNvSpPr txBox="1"/>
+            <p:nvPr/>
+          </p:nvSpPr>
+          <p:spPr>
+            <a:xfrm>
+              <a:off x="1066380" y="2258917"/>
+              <a:ext cx="1534402" cy="276999"/>
+            </a:xfrm>
+            <a:prstGeom prst="rect">
+              <a:avLst/>
+            </a:prstGeom>
+            <a:noFill/>
+          </p:spPr>
+          <p:txBody>
+            <a:bodyPr wrap="square" rtlCol="0">
+              <a:spAutoFit/>
+            </a:bodyPr>
+            <a:lstStyle/>
+            <a:p>
+              <a:pPr marL="0" marR="0" lvl="0" indent="0" algn="l" defTabSz="914400" rtl="0" eaLnBrk="1" fontAlgn="auto" latinLnBrk="0" hangingPunct="1">
+                <a:lnSpc>
+                  <a:spcPct val="100000"/>
+                </a:lnSpc>
+                <a:spcBef>
+                  <a:spcPts val="0"/>
+                </a:spcBef>
+                <a:spcAft>
+                  <a:spcPts val="0"/>
+                </a:spcAft>
+                <a:buClrTx/>
+                <a:buSzTx/>
+                <a:buFontTx/>
+                <a:buNone/>
+                <a:tabLst/>
+                <a:defRPr/>
+              </a:pPr>
+              <a:r>
+                <a:rPr kumimoji="0" lang="en-US" altLang="zh-CN" sz="1200" b="0" i="0" u="none" strike="noStrike" kern="1200" cap="none" spc="0" normalizeH="0" baseline="0" noProof="0" dirty="0">
+                  <a:ln>
+                    <a:noFill/>
+                  </a:ln>
+                  <a:solidFill>
+                    <a:srgbClr val="404040"/>
+                  </a:solidFill>
+                  <a:effectLst/>
+                  <a:uLnTx/>
+                  <a:uFillTx/>
+                  <a:latin typeface="Arial" panose="020B0604020202020204" pitchFamily="34" charset="0"/>
+                  <a:ea typeface="等线" panose="02010600030101010101" pitchFamily="2" charset="-122"/>
+                  <a:cs typeface="Arial" panose="020B0604020202020204" pitchFamily="34" charset="0"/>
+                </a:rPr>
+                <a:t>Date</a:t>
+              </a:r>
+              <a:endParaRPr kumimoji="0" lang="zh-CN" altLang="en-US" sz="1400" b="0" i="0" u="none" strike="noStrike" kern="1200" cap="none" spc="0" normalizeH="0" baseline="0" noProof="0" dirty="0">
+                <a:ln>
+                  <a:noFill/>
+                </a:ln>
+                <a:solidFill>
+                  <a:srgbClr val="404040"/>
+                </a:solidFill>
+                <a:effectLst/>
+                <a:uLnTx/>
+                <a:uFillTx/>
+                <a:latin typeface="Arial" panose="020B0604020202020204" pitchFamily="34" charset="0"/>
+                <a:ea typeface="等线" panose="02010600030101010101" pitchFamily="2" charset="-122"/>
+                <a:cs typeface="Arial" panose="020B0604020202020204" pitchFamily="34" charset="0"/>
+              </a:endParaRPr>
+            </a:p>
+          </p:txBody>
+        </p:sp>
+        <p:sp>
+          <p:nvSpPr>
+            <p:cNvPr id="30" name="文本框 29">
+              <a:extLst>
+                <a:ext uri="{FF2B5EF4-FFF2-40B4-BE49-F238E27FC236}">
+                  <a16:creationId xmlns:a16="http://schemas.microsoft.com/office/drawing/2014/main" id="{9D993EE1-10E5-74FC-EFA1-7FFEB433D193}"/>
+                </a:ext>
+              </a:extLst>
+            </p:cNvPr>
+            <p:cNvSpPr txBox="1"/>
+            <p:nvPr/>
+          </p:nvSpPr>
+          <p:spPr>
+            <a:xfrm>
+              <a:off x="1066382" y="2799598"/>
+              <a:ext cx="1534402" cy="276999"/>
+            </a:xfrm>
+            <a:prstGeom prst="rect">
+              <a:avLst/>
+            </a:prstGeom>
+            <a:noFill/>
+          </p:spPr>
+          <p:txBody>
+            <a:bodyPr wrap="square" rtlCol="0">
+              <a:spAutoFit/>
+            </a:bodyPr>
+            <a:lstStyle/>
+            <a:p>
+              <a:pPr marL="0" marR="0" lvl="0" indent="0" algn="l" defTabSz="914400" rtl="0" eaLnBrk="1" fontAlgn="auto" latinLnBrk="0" hangingPunct="1">
+                <a:lnSpc>
+                  <a:spcPct val="100000"/>
+                </a:lnSpc>
+                <a:spcBef>
+                  <a:spcPts val="0"/>
+                </a:spcBef>
+                <a:spcAft>
+                  <a:spcPts val="0"/>
+                </a:spcAft>
+                <a:buClrTx/>
+                <a:buSzTx/>
+                <a:buFontTx/>
+                <a:buNone/>
+                <a:tabLst/>
+                <a:defRPr/>
+              </a:pPr>
+              <a:r>
+                <a:rPr kumimoji="0" lang="en-US" altLang="zh-CN" sz="1200" b="0" i="0" u="none" strike="noStrike" kern="1200" cap="none" spc="0" normalizeH="0" baseline="0" noProof="0" dirty="0">
+                  <a:ln>
+                    <a:noFill/>
+                  </a:ln>
+                  <a:solidFill>
+                    <a:srgbClr val="404040"/>
+                  </a:solidFill>
+                  <a:effectLst/>
+                  <a:uLnTx/>
+                  <a:uFillTx/>
+                  <a:latin typeface="Arial" panose="020B0604020202020204" pitchFamily="34" charset="0"/>
+                  <a:ea typeface="等线" panose="02010600030101010101" pitchFamily="2" charset="-122"/>
+                  <a:cs typeface="Arial" panose="020B0604020202020204" pitchFamily="34" charset="0"/>
+                </a:rPr>
+                <a:t>Class</a:t>
+              </a:r>
+              <a:endParaRPr kumimoji="0" lang="zh-CN" altLang="en-US" sz="1400" b="0" i="0" u="none" strike="noStrike" kern="1200" cap="none" spc="0" normalizeH="0" baseline="0" noProof="0" dirty="0">
+                <a:ln>
+                  <a:noFill/>
+                </a:ln>
+                <a:solidFill>
+                  <a:srgbClr val="404040"/>
+                </a:solidFill>
+                <a:effectLst/>
+                <a:uLnTx/>
+                <a:uFillTx/>
+                <a:latin typeface="Arial" panose="020B0604020202020204" pitchFamily="34" charset="0"/>
+                <a:ea typeface="等线" panose="02010600030101010101" pitchFamily="2" charset="-122"/>
+                <a:cs typeface="Arial" panose="020B0604020202020204" pitchFamily="34" charset="0"/>
+              </a:endParaRPr>
+            </a:p>
+          </p:txBody>
+        </p:sp>
+        <p:sp>
+          <p:nvSpPr>
+            <p:cNvPr id="34" name="文本框 33">
+              <a:extLst>
+                <a:ext uri="{FF2B5EF4-FFF2-40B4-BE49-F238E27FC236}">
+                  <a16:creationId xmlns:a16="http://schemas.microsoft.com/office/drawing/2014/main" id="{E6C1C881-CD71-F33A-3CC9-FAB3DC70527B}"/>
+                </a:ext>
+              </a:extLst>
+            </p:cNvPr>
+            <p:cNvSpPr txBox="1"/>
+            <p:nvPr/>
+          </p:nvSpPr>
+          <p:spPr>
+            <a:xfrm>
+              <a:off x="5337636" y="1263821"/>
+              <a:ext cx="1534402" cy="276999"/>
+            </a:xfrm>
+            <a:prstGeom prst="rect">
+              <a:avLst/>
+            </a:prstGeom>
+            <a:noFill/>
+          </p:spPr>
+          <p:txBody>
+            <a:bodyPr wrap="square" rtlCol="0">
+              <a:spAutoFit/>
+            </a:bodyPr>
+            <a:lstStyle/>
+            <a:p>
+              <a:pPr marL="0" marR="0" lvl="0" indent="0" algn="l" defTabSz="914400" rtl="0" eaLnBrk="1" fontAlgn="auto" latinLnBrk="0" hangingPunct="1">
+                <a:lnSpc>
+                  <a:spcPct val="100000"/>
+                </a:lnSpc>
+                <a:spcBef>
+                  <a:spcPts val="0"/>
+                </a:spcBef>
+                <a:spcAft>
+                  <a:spcPts val="0"/>
+                </a:spcAft>
+                <a:buClrTx/>
+                <a:buSzTx/>
+                <a:buFontTx/>
+                <a:buNone/>
+                <a:tabLst/>
+                <a:defRPr/>
+              </a:pPr>
+              <a:r>
+                <a:rPr kumimoji="0" lang="en-US" altLang="zh-CN" sz="1200" b="0" i="0" u="none" strike="noStrike" kern="1200" cap="none" spc="0" normalizeH="0" baseline="0" noProof="0" dirty="0">
+                  <a:ln>
+                    <a:noFill/>
+                  </a:ln>
+                  <a:solidFill>
+                    <a:srgbClr val="404040"/>
+                  </a:solidFill>
+                  <a:effectLst/>
+                  <a:uLnTx/>
+                  <a:uFillTx/>
+                  <a:latin typeface="Arial" panose="020B0604020202020204" pitchFamily="34" charset="0"/>
+                  <a:ea typeface="等线" panose="02010600030101010101" pitchFamily="2" charset="-122"/>
+                  <a:cs typeface="Arial" panose="020B0604020202020204" pitchFamily="34" charset="0"/>
+                </a:rPr>
+                <a:t>Flight Number</a:t>
+              </a:r>
+              <a:endParaRPr kumimoji="0" lang="zh-CN" altLang="en-US" sz="1200" b="0" i="0" u="none" strike="noStrike" kern="1200" cap="none" spc="0" normalizeH="0" baseline="0" noProof="0" dirty="0">
+                <a:ln>
+                  <a:noFill/>
+                </a:ln>
+                <a:solidFill>
+                  <a:srgbClr val="404040"/>
+                </a:solidFill>
+                <a:effectLst/>
+                <a:uLnTx/>
+                <a:uFillTx/>
+                <a:latin typeface="Arial" panose="020B0604020202020204" pitchFamily="34" charset="0"/>
+                <a:ea typeface="等线" panose="02010600030101010101" pitchFamily="2" charset="-122"/>
+                <a:cs typeface="Arial" panose="020B0604020202020204" pitchFamily="34" charset="0"/>
+              </a:endParaRPr>
+            </a:p>
+          </p:txBody>
+        </p:sp>
+        <p:sp>
+          <p:nvSpPr>
+            <p:cNvPr id="36" name="文本框 35">
+              <a:extLst>
+                <a:ext uri="{FF2B5EF4-FFF2-40B4-BE49-F238E27FC236}">
+                  <a16:creationId xmlns:a16="http://schemas.microsoft.com/office/drawing/2014/main" id="{16D06C21-551E-2EAA-BEED-C314DB3119CA}"/>
+                </a:ext>
+              </a:extLst>
+            </p:cNvPr>
+            <p:cNvSpPr txBox="1"/>
+            <p:nvPr/>
+          </p:nvSpPr>
+          <p:spPr>
+            <a:xfrm>
+              <a:off x="5337636" y="2002238"/>
+              <a:ext cx="1534402" cy="276999"/>
+            </a:xfrm>
+            <a:prstGeom prst="rect">
+              <a:avLst/>
+            </a:prstGeom>
+            <a:noFill/>
+          </p:spPr>
+          <p:txBody>
+            <a:bodyPr wrap="square" rtlCol="0">
+              <a:spAutoFit/>
+            </a:bodyPr>
+            <a:lstStyle/>
+            <a:p>
+              <a:pPr marL="0" marR="0" lvl="0" indent="0" algn="l" defTabSz="914400" rtl="0" eaLnBrk="1" fontAlgn="auto" latinLnBrk="0" hangingPunct="1">
+                <a:lnSpc>
+                  <a:spcPct val="100000"/>
+                </a:lnSpc>
+                <a:spcBef>
+                  <a:spcPts val="0"/>
+                </a:spcBef>
+                <a:spcAft>
+                  <a:spcPts val="0"/>
+                </a:spcAft>
+                <a:buClrTx/>
+                <a:buSzTx/>
+                <a:buFontTx/>
+                <a:buNone/>
+                <a:tabLst/>
+                <a:defRPr/>
+              </a:pPr>
+              <a:r>
+                <a:rPr kumimoji="0" lang="en-US" altLang="zh-CN" sz="1200" b="0" i="0" u="none" strike="noStrike" kern="1200" cap="none" spc="0" normalizeH="0" baseline="0" noProof="0" dirty="0">
+                  <a:ln>
+                    <a:noFill/>
+                  </a:ln>
+                  <a:solidFill>
+                    <a:srgbClr val="404040"/>
+                  </a:solidFill>
+                  <a:effectLst/>
+                  <a:uLnTx/>
+                  <a:uFillTx/>
+                  <a:latin typeface="Arial" panose="020B0604020202020204" pitchFamily="34" charset="0"/>
+                  <a:ea typeface="等线" panose="02010600030101010101" pitchFamily="2" charset="-122"/>
+                  <a:cs typeface="Arial" panose="020B0604020202020204" pitchFamily="34" charset="0"/>
+                </a:rPr>
+                <a:t>Boarding Time</a:t>
+              </a:r>
+              <a:endParaRPr kumimoji="0" lang="zh-CN" altLang="en-US" sz="1200" b="0" i="0" u="none" strike="noStrike" kern="1200" cap="none" spc="0" normalizeH="0" baseline="0" noProof="0" dirty="0">
+                <a:ln>
+                  <a:noFill/>
+                </a:ln>
+                <a:solidFill>
+                  <a:srgbClr val="404040"/>
+                </a:solidFill>
+                <a:effectLst/>
+                <a:uLnTx/>
+                <a:uFillTx/>
+                <a:latin typeface="Arial" panose="020B0604020202020204" pitchFamily="34" charset="0"/>
+                <a:ea typeface="等线" panose="02010600030101010101" pitchFamily="2" charset="-122"/>
+                <a:cs typeface="Arial" panose="020B0604020202020204" pitchFamily="34" charset="0"/>
+              </a:endParaRPr>
+            </a:p>
+          </p:txBody>
+        </p:sp>
+        <p:sp>
+          <p:nvSpPr>
+            <p:cNvPr id="37" name="文本框 36">
+              <a:extLst>
+                <a:ext uri="{FF2B5EF4-FFF2-40B4-BE49-F238E27FC236}">
+                  <a16:creationId xmlns:a16="http://schemas.microsoft.com/office/drawing/2014/main" id="{9CAA8569-816E-3C13-45CC-49BA8CC5A3B5}"/>
+                </a:ext>
+              </a:extLst>
+            </p:cNvPr>
+            <p:cNvSpPr txBox="1"/>
+            <p:nvPr/>
+          </p:nvSpPr>
+          <p:spPr>
+            <a:xfrm>
+              <a:off x="5337636" y="2799598"/>
+              <a:ext cx="1534402" cy="276999"/>
+            </a:xfrm>
+            <a:prstGeom prst="rect">
+              <a:avLst/>
+            </a:prstGeom>
+            <a:noFill/>
+          </p:spPr>
+          <p:txBody>
+            <a:bodyPr wrap="square" rtlCol="0">
+              <a:spAutoFit/>
+            </a:bodyPr>
+            <a:lstStyle/>
+            <a:p>
+              <a:pPr marL="0" marR="0" lvl="0" indent="0" algn="l" defTabSz="914400" rtl="0" eaLnBrk="1" fontAlgn="auto" latinLnBrk="0" hangingPunct="1">
+                <a:lnSpc>
+                  <a:spcPct val="100000"/>
+                </a:lnSpc>
+                <a:spcBef>
+                  <a:spcPts val="0"/>
+                </a:spcBef>
+                <a:spcAft>
+                  <a:spcPts val="0"/>
+                </a:spcAft>
+                <a:buClrTx/>
+                <a:buSzTx/>
+                <a:buFontTx/>
+                <a:buNone/>
+                <a:tabLst/>
+                <a:defRPr/>
+              </a:pPr>
+              <a:r>
+                <a:rPr kumimoji="0" lang="en-US" altLang="zh-CN" sz="1200" b="0" i="0" u="none" strike="noStrike" kern="1200" cap="none" spc="0" normalizeH="0" baseline="0" noProof="0" dirty="0">
+                  <a:ln>
+                    <a:noFill/>
+                  </a:ln>
+                  <a:solidFill>
+                    <a:srgbClr val="404040"/>
+                  </a:solidFill>
+                  <a:effectLst/>
+                  <a:uLnTx/>
+                  <a:uFillTx/>
+                  <a:latin typeface="Arial" panose="020B0604020202020204" pitchFamily="34" charset="0"/>
+                  <a:ea typeface="等线" panose="02010600030101010101" pitchFamily="2" charset="-122"/>
+                  <a:cs typeface="Arial" panose="020B0604020202020204" pitchFamily="34" charset="0"/>
+                </a:rPr>
+                <a:t>Seat</a:t>
+              </a:r>
+              <a:endParaRPr kumimoji="0" lang="zh-CN" altLang="en-US" sz="1200" b="0" i="0" u="none" strike="noStrike" kern="1200" cap="none" spc="0" normalizeH="0" baseline="0" noProof="0" dirty="0">
+                <a:ln>
+                  <a:noFill/>
+                </a:ln>
+                <a:solidFill>
+                  <a:srgbClr val="404040"/>
+                </a:solidFill>
+                <a:effectLst/>
+                <a:uLnTx/>
+                <a:uFillTx/>
+                <a:latin typeface="Arial" panose="020B0604020202020204" pitchFamily="34" charset="0"/>
+                <a:ea typeface="等线" panose="02010600030101010101" pitchFamily="2" charset="-122"/>
+                <a:cs typeface="Arial" panose="020B0604020202020204" pitchFamily="34" charset="0"/>
+              </a:endParaRPr>
+            </a:p>
+          </p:txBody>
+        </p:sp>
+        <p:sp>
+          <p:nvSpPr>
+            <p:cNvPr id="40" name="文本框 39">
+              <a:extLst>
+                <a:ext uri="{FF2B5EF4-FFF2-40B4-BE49-F238E27FC236}">
+                  <a16:creationId xmlns:a16="http://schemas.microsoft.com/office/drawing/2014/main" id="{D6539A28-48FE-184E-62A8-6DA42F01DE57}"/>
+                </a:ext>
+              </a:extLst>
+            </p:cNvPr>
+            <p:cNvSpPr txBox="1"/>
+            <p:nvPr/>
+          </p:nvSpPr>
+          <p:spPr>
+            <a:xfrm>
+              <a:off x="6872038" y="1263821"/>
+              <a:ext cx="1534402" cy="276999"/>
+            </a:xfrm>
+            <a:prstGeom prst="rect">
+              <a:avLst/>
+            </a:prstGeom>
+            <a:noFill/>
+          </p:spPr>
+          <p:txBody>
+            <a:bodyPr wrap="square" rtlCol="0">
+              <a:spAutoFit/>
+            </a:bodyPr>
+            <a:lstStyle/>
+            <a:p>
+              <a:pPr marL="0" marR="0" lvl="0" indent="0" algn="l" defTabSz="914400" rtl="0" eaLnBrk="1" fontAlgn="auto" latinLnBrk="0" hangingPunct="1">
+                <a:lnSpc>
+                  <a:spcPct val="100000"/>
+                </a:lnSpc>
+                <a:spcBef>
+                  <a:spcPts val="0"/>
+                </a:spcBef>
+                <a:spcAft>
+                  <a:spcPts val="0"/>
+                </a:spcAft>
+                <a:buClrTx/>
+                <a:buSzTx/>
+                <a:buFontTx/>
+                <a:buNone/>
+                <a:tabLst/>
+                <a:defRPr/>
+              </a:pPr>
+              <a:r>
+                <a:rPr kumimoji="0" lang="en-US" altLang="zh-CN" sz="1200" b="0" i="0" u="none" strike="noStrike" kern="1200" cap="none" spc="0" normalizeH="0" baseline="0" noProof="0" dirty="0">
+                  <a:ln>
+                    <a:noFill/>
+                  </a:ln>
+                  <a:solidFill>
+                    <a:srgbClr val="404040"/>
+                  </a:solidFill>
+                  <a:effectLst/>
+                  <a:uLnTx/>
+                  <a:uFillTx/>
+                  <a:latin typeface="Arial" panose="020B0604020202020204" pitchFamily="34" charset="0"/>
+                  <a:ea typeface="等线" panose="02010600030101010101" pitchFamily="2" charset="-122"/>
+                  <a:cs typeface="Arial" panose="020B0604020202020204" pitchFamily="34" charset="0"/>
+                </a:rPr>
+                <a:t>Terminal</a:t>
+              </a:r>
+              <a:endParaRPr kumimoji="0" lang="zh-CN" altLang="en-US" sz="1200" b="0" i="0" u="none" strike="noStrike" kern="1200" cap="none" spc="0" normalizeH="0" baseline="0" noProof="0" dirty="0">
+                <a:ln>
+                  <a:noFill/>
+                </a:ln>
+                <a:solidFill>
+                  <a:srgbClr val="404040"/>
+                </a:solidFill>
+                <a:effectLst/>
+                <a:uLnTx/>
+                <a:uFillTx/>
+                <a:latin typeface="Arial" panose="020B0604020202020204" pitchFamily="34" charset="0"/>
+                <a:ea typeface="等线" panose="02010600030101010101" pitchFamily="2" charset="-122"/>
+                <a:cs typeface="Arial" panose="020B0604020202020204" pitchFamily="34" charset="0"/>
+              </a:endParaRPr>
+            </a:p>
+          </p:txBody>
+        </p:sp>
+        <p:sp>
+          <p:nvSpPr>
+            <p:cNvPr id="41" name="文本框 40">
+              <a:extLst>
+                <a:ext uri="{FF2B5EF4-FFF2-40B4-BE49-F238E27FC236}">
+                  <a16:creationId xmlns:a16="http://schemas.microsoft.com/office/drawing/2014/main" id="{3C06878A-78FF-1FCA-CB04-E18E99045E88}"/>
+                </a:ext>
+              </a:extLst>
+            </p:cNvPr>
+            <p:cNvSpPr txBox="1"/>
+            <p:nvPr/>
+          </p:nvSpPr>
+          <p:spPr>
+            <a:xfrm>
+              <a:off x="6872038" y="1978923"/>
+              <a:ext cx="1534402" cy="276999"/>
+            </a:xfrm>
+            <a:prstGeom prst="rect">
+              <a:avLst/>
+            </a:prstGeom>
+            <a:noFill/>
+          </p:spPr>
+          <p:txBody>
+            <a:bodyPr wrap="square" rtlCol="0">
+              <a:spAutoFit/>
+            </a:bodyPr>
+            <a:lstStyle/>
+            <a:p>
+              <a:pPr marL="0" marR="0" lvl="0" indent="0" algn="l" defTabSz="914400" rtl="0" eaLnBrk="1" fontAlgn="auto" latinLnBrk="0" hangingPunct="1">
+                <a:lnSpc>
+                  <a:spcPct val="100000"/>
+                </a:lnSpc>
+                <a:spcBef>
+                  <a:spcPts val="0"/>
+                </a:spcBef>
+                <a:spcAft>
+                  <a:spcPts val="0"/>
+                </a:spcAft>
+                <a:buClrTx/>
+                <a:buSzTx/>
+                <a:buFontTx/>
+                <a:buNone/>
+                <a:tabLst/>
+                <a:defRPr/>
+              </a:pPr>
+              <a:r>
+                <a:rPr kumimoji="0" lang="en-US" altLang="zh-CN" sz="1200" b="0" i="0" u="none" strike="noStrike" kern="1200" cap="none" spc="0" normalizeH="0" baseline="0" noProof="0" dirty="0">
+                  <a:ln>
+                    <a:noFill/>
+                  </a:ln>
+                  <a:solidFill>
+                    <a:srgbClr val="404040"/>
+                  </a:solidFill>
+                  <a:effectLst/>
+                  <a:uLnTx/>
+                  <a:uFillTx/>
+                  <a:latin typeface="Arial" panose="020B0604020202020204" pitchFamily="34" charset="0"/>
+                  <a:ea typeface="等线" panose="02010600030101010101" pitchFamily="2" charset="-122"/>
+                  <a:cs typeface="Arial" panose="020B0604020202020204" pitchFamily="34" charset="0"/>
+                </a:rPr>
+                <a:t>Gate</a:t>
+              </a:r>
+              <a:endParaRPr kumimoji="0" lang="zh-CN" altLang="en-US" sz="1200" b="0" i="0" u="none" strike="noStrike" kern="1200" cap="none" spc="0" normalizeH="0" baseline="0" noProof="0" dirty="0">
+                <a:ln>
+                  <a:noFill/>
+                </a:ln>
+                <a:solidFill>
+                  <a:srgbClr val="404040"/>
+                </a:solidFill>
+                <a:effectLst/>
+                <a:uLnTx/>
+                <a:uFillTx/>
+                <a:latin typeface="Arial" panose="020B0604020202020204" pitchFamily="34" charset="0"/>
+                <a:ea typeface="等线" panose="02010600030101010101" pitchFamily="2" charset="-122"/>
+                <a:cs typeface="Arial" panose="020B0604020202020204" pitchFamily="34" charset="0"/>
+              </a:endParaRPr>
+            </a:p>
+          </p:txBody>
+        </p:sp>
+        <p:sp>
+          <p:nvSpPr>
+            <p:cNvPr id="46" name="文本框 45">
+              <a:extLst>
+                <a:ext uri="{FF2B5EF4-FFF2-40B4-BE49-F238E27FC236}">
+                  <a16:creationId xmlns:a16="http://schemas.microsoft.com/office/drawing/2014/main" id="{F50F7B0B-1D12-66EF-5A8F-B222B40C717A}"/>
+                </a:ext>
+              </a:extLst>
+            </p:cNvPr>
+            <p:cNvSpPr txBox="1"/>
+            <p:nvPr/>
+          </p:nvSpPr>
+          <p:spPr>
+            <a:xfrm>
+              <a:off x="8759028" y="1096457"/>
+              <a:ext cx="1534402" cy="276999"/>
+            </a:xfrm>
+            <a:prstGeom prst="rect">
+              <a:avLst/>
+            </a:prstGeom>
+            <a:noFill/>
+          </p:spPr>
+          <p:txBody>
+            <a:bodyPr wrap="square" rtlCol="0">
+              <a:spAutoFit/>
+            </a:bodyPr>
+            <a:lstStyle/>
+            <a:p>
+              <a:pPr marL="0" marR="0" lvl="0" indent="0" algn="l" defTabSz="914400" rtl="0" eaLnBrk="1" fontAlgn="auto" latinLnBrk="0" hangingPunct="1">
+                <a:lnSpc>
+                  <a:spcPct val="100000"/>
+                </a:lnSpc>
+                <a:spcBef>
+                  <a:spcPts val="0"/>
+                </a:spcBef>
+                <a:spcAft>
+                  <a:spcPts val="0"/>
+                </a:spcAft>
+                <a:buClrTx/>
+                <a:buSzTx/>
+                <a:buFontTx/>
+                <a:buNone/>
+                <a:tabLst/>
+                <a:defRPr/>
+              </a:pPr>
+              <a:r>
+                <a:rPr kumimoji="0" lang="en-US" altLang="zh-CN" sz="1200" b="0" i="0" u="none" strike="noStrike" kern="1200" cap="none" spc="0" normalizeH="0" baseline="0" noProof="0" dirty="0">
+                  <a:ln>
+                    <a:noFill/>
+                  </a:ln>
+                  <a:solidFill>
+                    <a:srgbClr val="404040"/>
+                  </a:solidFill>
+                  <a:effectLst/>
+                  <a:uLnTx/>
+                  <a:uFillTx/>
+                  <a:latin typeface="Arial" panose="020B0604020202020204" pitchFamily="34" charset="0"/>
+                  <a:ea typeface="等线" panose="02010600030101010101" pitchFamily="2" charset="-122"/>
+                  <a:cs typeface="Arial" panose="020B0604020202020204" pitchFamily="34" charset="0"/>
+                </a:rPr>
+                <a:t>Passenger name</a:t>
+              </a:r>
+              <a:endParaRPr kumimoji="0" lang="zh-CN" altLang="en-US" sz="1200" b="0" i="0" u="none" strike="noStrike" kern="1200" cap="none" spc="0" normalizeH="0" baseline="0" noProof="0" dirty="0">
+                <a:ln>
+                  <a:noFill/>
+                </a:ln>
+                <a:solidFill>
+                  <a:srgbClr val="404040"/>
+                </a:solidFill>
+                <a:effectLst/>
+                <a:uLnTx/>
+                <a:uFillTx/>
+                <a:latin typeface="Arial" panose="020B0604020202020204" pitchFamily="34" charset="0"/>
+                <a:ea typeface="等线" panose="02010600030101010101" pitchFamily="2" charset="-122"/>
+                <a:cs typeface="Arial" panose="020B0604020202020204" pitchFamily="34" charset="0"/>
+              </a:endParaRPr>
+            </a:p>
+          </p:txBody>
+        </p:sp>
+        <p:sp>
+          <p:nvSpPr>
+            <p:cNvPr id="47" name="文本框 46">
+              <a:extLst>
+                <a:ext uri="{FF2B5EF4-FFF2-40B4-BE49-F238E27FC236}">
+                  <a16:creationId xmlns:a16="http://schemas.microsoft.com/office/drawing/2014/main" id="{D5AC2F63-81E4-A294-DA78-2656360F4B9F}"/>
+                </a:ext>
+              </a:extLst>
+            </p:cNvPr>
+            <p:cNvSpPr txBox="1"/>
+            <p:nvPr/>
+          </p:nvSpPr>
+          <p:spPr>
+            <a:xfrm>
+              <a:off x="8759028" y="1491338"/>
+              <a:ext cx="1534402" cy="276999"/>
+            </a:xfrm>
+            <a:prstGeom prst="rect">
+              <a:avLst/>
+            </a:prstGeom>
+            <a:noFill/>
+          </p:spPr>
+          <p:txBody>
+            <a:bodyPr wrap="square" rtlCol="0">
+              <a:spAutoFit/>
+            </a:bodyPr>
+            <a:lstStyle/>
+            <a:p>
+              <a:pPr marL="0" marR="0" lvl="0" indent="0" algn="l" defTabSz="914400" rtl="0" eaLnBrk="1" fontAlgn="auto" latinLnBrk="0" hangingPunct="1">
+                <a:lnSpc>
+                  <a:spcPct val="100000"/>
+                </a:lnSpc>
+                <a:spcBef>
+                  <a:spcPts val="0"/>
+                </a:spcBef>
+                <a:spcAft>
+                  <a:spcPts val="0"/>
+                </a:spcAft>
+                <a:buClrTx/>
+                <a:buSzTx/>
+                <a:buFontTx/>
+                <a:buNone/>
+                <a:tabLst/>
+                <a:defRPr/>
+              </a:pPr>
+              <a:r>
+                <a:rPr kumimoji="0" lang="en-US" altLang="zh-CN" sz="1200" b="0" i="0" u="none" strike="noStrike" kern="1200" cap="none" spc="0" normalizeH="0" baseline="0" noProof="0" dirty="0">
+                  <a:ln>
+                    <a:noFill/>
+                  </a:ln>
+                  <a:solidFill>
+                    <a:srgbClr val="404040"/>
+                  </a:solidFill>
+                  <a:effectLst/>
+                  <a:uLnTx/>
+                  <a:uFillTx/>
+                  <a:latin typeface="Arial" panose="020B0604020202020204" pitchFamily="34" charset="0"/>
+                  <a:ea typeface="等线" panose="02010600030101010101" pitchFamily="2" charset="-122"/>
+                  <a:cs typeface="Arial" panose="020B0604020202020204" pitchFamily="34" charset="0"/>
+                </a:rPr>
+                <a:t>Date</a:t>
+              </a:r>
+              <a:endParaRPr kumimoji="0" lang="zh-CN" altLang="en-US" sz="1400" b="0" i="0" u="none" strike="noStrike" kern="1200" cap="none" spc="0" normalizeH="0" baseline="0" noProof="0" dirty="0">
+                <a:ln>
+                  <a:noFill/>
+                </a:ln>
+                <a:solidFill>
+                  <a:srgbClr val="404040"/>
+                </a:solidFill>
+                <a:effectLst/>
+                <a:uLnTx/>
+                <a:uFillTx/>
+                <a:latin typeface="Arial" panose="020B0604020202020204" pitchFamily="34" charset="0"/>
+                <a:ea typeface="等线" panose="02010600030101010101" pitchFamily="2" charset="-122"/>
+                <a:cs typeface="Arial" panose="020B0604020202020204" pitchFamily="34" charset="0"/>
+              </a:endParaRPr>
+            </a:p>
+          </p:txBody>
+        </p:sp>
+        <p:sp>
+          <p:nvSpPr>
+            <p:cNvPr id="50" name="文本框 49">
+              <a:extLst>
+                <a:ext uri="{FF2B5EF4-FFF2-40B4-BE49-F238E27FC236}">
+                  <a16:creationId xmlns:a16="http://schemas.microsoft.com/office/drawing/2014/main" id="{9F0C8C22-6AA1-151E-4B6B-264E20E1F7A2}"/>
+                </a:ext>
+              </a:extLst>
+            </p:cNvPr>
+            <p:cNvSpPr txBox="1"/>
+            <p:nvPr/>
+          </p:nvSpPr>
+          <p:spPr>
+            <a:xfrm>
+              <a:off x="8759027" y="1730775"/>
+              <a:ext cx="613265" cy="276999"/>
+            </a:xfrm>
+            <a:prstGeom prst="rect">
+              <a:avLst/>
+            </a:prstGeom>
+            <a:noFill/>
+          </p:spPr>
+          <p:txBody>
+            <a:bodyPr wrap="square" rtlCol="0">
+              <a:spAutoFit/>
+            </a:bodyPr>
+            <a:lstStyle/>
+            <a:p>
+              <a:pPr marL="0" marR="0" lvl="0" indent="0" algn="l" defTabSz="914400" rtl="0" eaLnBrk="1" fontAlgn="auto" latinLnBrk="0" hangingPunct="1">
+                <a:lnSpc>
+                  <a:spcPct val="100000"/>
+                </a:lnSpc>
+                <a:spcBef>
+                  <a:spcPts val="0"/>
+                </a:spcBef>
+                <a:spcAft>
+                  <a:spcPts val="0"/>
+                </a:spcAft>
+                <a:buClrTx/>
+                <a:buSzTx/>
+                <a:buFontTx/>
+                <a:buNone/>
+                <a:tabLst/>
+                <a:defRPr/>
+              </a:pPr>
+              <a:r>
+                <a:rPr kumimoji="0" lang="en-US" altLang="zh-CN" sz="1200" b="0" i="0" u="none" strike="noStrike" kern="1200" cap="none" spc="0" normalizeH="0" baseline="0" noProof="0" dirty="0">
+                  <a:ln>
+                    <a:noFill/>
+                  </a:ln>
+                  <a:solidFill>
+                    <a:srgbClr val="404040"/>
+                  </a:solidFill>
+                  <a:effectLst/>
+                  <a:uLnTx/>
+                  <a:uFillTx/>
+                  <a:latin typeface="Arial" panose="020B0604020202020204" pitchFamily="34" charset="0"/>
+                  <a:ea typeface="等线" panose="02010600030101010101" pitchFamily="2" charset="-122"/>
+                  <a:cs typeface="Arial" panose="020B0604020202020204" pitchFamily="34" charset="0"/>
+                </a:rPr>
+                <a:t>from</a:t>
+              </a:r>
+              <a:endParaRPr kumimoji="0" lang="zh-CN" altLang="en-US" sz="1200" b="0" i="0" u="none" strike="noStrike" kern="1200" cap="none" spc="0" normalizeH="0" baseline="0" noProof="0" dirty="0">
+                <a:ln>
+                  <a:noFill/>
+                </a:ln>
+                <a:solidFill>
+                  <a:srgbClr val="404040"/>
+                </a:solidFill>
+                <a:effectLst/>
+                <a:uLnTx/>
+                <a:uFillTx/>
+                <a:latin typeface="Arial" panose="020B0604020202020204" pitchFamily="34" charset="0"/>
+                <a:ea typeface="等线" panose="02010600030101010101" pitchFamily="2" charset="-122"/>
+                <a:cs typeface="Arial" panose="020B0604020202020204" pitchFamily="34" charset="0"/>
+              </a:endParaRPr>
+            </a:p>
+          </p:txBody>
+        </p:sp>
+        <p:sp>
+          <p:nvSpPr>
+            <p:cNvPr id="52" name="文本框 51">
+              <a:extLst>
+                <a:ext uri="{FF2B5EF4-FFF2-40B4-BE49-F238E27FC236}">
+                  <a16:creationId xmlns:a16="http://schemas.microsoft.com/office/drawing/2014/main" id="{0E01B530-2EC7-5B77-24C4-75A8E3E994D3}"/>
+                </a:ext>
+              </a:extLst>
+            </p:cNvPr>
+            <p:cNvSpPr txBox="1"/>
+            <p:nvPr/>
+          </p:nvSpPr>
+          <p:spPr>
+            <a:xfrm>
+              <a:off x="8759027" y="2157424"/>
+              <a:ext cx="396240" cy="276999"/>
+            </a:xfrm>
+            <a:prstGeom prst="rect">
+              <a:avLst/>
+            </a:prstGeom>
+            <a:noFill/>
+          </p:spPr>
+          <p:txBody>
+            <a:bodyPr wrap="square" rtlCol="0">
+              <a:spAutoFit/>
+            </a:bodyPr>
+            <a:lstStyle/>
+            <a:p>
+              <a:pPr marL="0" marR="0" lvl="0" indent="0" algn="l" defTabSz="914400" rtl="0" eaLnBrk="1" fontAlgn="auto" latinLnBrk="0" hangingPunct="1">
+                <a:lnSpc>
+                  <a:spcPct val="100000"/>
+                </a:lnSpc>
+                <a:spcBef>
+                  <a:spcPts val="0"/>
+                </a:spcBef>
+                <a:spcAft>
+                  <a:spcPts val="0"/>
+                </a:spcAft>
+                <a:buClrTx/>
+                <a:buSzTx/>
+                <a:buFontTx/>
+                <a:buNone/>
+                <a:tabLst/>
+                <a:defRPr/>
+              </a:pPr>
+              <a:r>
+                <a:rPr kumimoji="0" lang="en-US" altLang="zh-CN" sz="1200" b="0" i="0" u="none" strike="noStrike" kern="1200" cap="none" spc="0" normalizeH="0" baseline="0" noProof="0" dirty="0">
+                  <a:ln>
+                    <a:noFill/>
+                  </a:ln>
+                  <a:solidFill>
+                    <a:srgbClr val="404040"/>
+                  </a:solidFill>
+                  <a:effectLst/>
+                  <a:uLnTx/>
+                  <a:uFillTx/>
+                  <a:latin typeface="Arial" panose="020B0604020202020204" pitchFamily="34" charset="0"/>
+                  <a:ea typeface="等线" panose="02010600030101010101" pitchFamily="2" charset="-122"/>
+                  <a:cs typeface="Arial" panose="020B0604020202020204" pitchFamily="34" charset="0"/>
+                </a:rPr>
+                <a:t>to</a:t>
+              </a:r>
+              <a:endParaRPr kumimoji="0" lang="zh-CN" altLang="en-US" sz="1200" b="0" i="0" u="none" strike="noStrike" kern="1200" cap="none" spc="0" normalizeH="0" baseline="0" noProof="0" dirty="0">
+                <a:ln>
+                  <a:noFill/>
+                </a:ln>
+                <a:solidFill>
+                  <a:srgbClr val="404040"/>
+                </a:solidFill>
+                <a:effectLst/>
+                <a:uLnTx/>
+                <a:uFillTx/>
+                <a:latin typeface="Arial" panose="020B0604020202020204" pitchFamily="34" charset="0"/>
+                <a:ea typeface="等线" panose="02010600030101010101" pitchFamily="2" charset="-122"/>
+                <a:cs typeface="Arial" panose="020B0604020202020204" pitchFamily="34" charset="0"/>
+              </a:endParaRPr>
+            </a:p>
+          </p:txBody>
+        </p:sp>
+        <p:sp>
+          <p:nvSpPr>
+            <p:cNvPr id="54" name="文本框 53">
+              <a:extLst>
+                <a:ext uri="{FF2B5EF4-FFF2-40B4-BE49-F238E27FC236}">
+                  <a16:creationId xmlns:a16="http://schemas.microsoft.com/office/drawing/2014/main" id="{750B1EF5-A233-0B1C-CFE9-C2EE67587A0B}"/>
+                </a:ext>
+              </a:extLst>
+            </p:cNvPr>
+            <p:cNvSpPr txBox="1"/>
+            <p:nvPr/>
+          </p:nvSpPr>
+          <p:spPr>
+            <a:xfrm>
+              <a:off x="9210549" y="2851231"/>
+              <a:ext cx="1534402" cy="276999"/>
+            </a:xfrm>
+            <a:prstGeom prst="rect">
+              <a:avLst/>
+            </a:prstGeom>
+            <a:noFill/>
+          </p:spPr>
+          <p:txBody>
+            <a:bodyPr wrap="square" rtlCol="0">
+              <a:spAutoFit/>
+            </a:bodyPr>
+            <a:lstStyle/>
+            <a:p>
+              <a:pPr marL="0" marR="0" lvl="0" indent="0" algn="l" defTabSz="914400" rtl="0" eaLnBrk="1" fontAlgn="auto" latinLnBrk="0" hangingPunct="1">
+                <a:lnSpc>
+                  <a:spcPct val="100000"/>
+                </a:lnSpc>
+                <a:spcBef>
+                  <a:spcPts val="0"/>
+                </a:spcBef>
+                <a:spcAft>
+                  <a:spcPts val="0"/>
+                </a:spcAft>
+                <a:buClrTx/>
+                <a:buSzTx/>
+                <a:buFontTx/>
+                <a:buNone/>
+                <a:tabLst/>
+                <a:defRPr/>
+              </a:pPr>
+              <a:r>
+                <a:rPr kumimoji="0" lang="en-US" altLang="zh-CN" sz="1200" b="0" i="0" u="none" strike="noStrike" kern="1200" cap="none" spc="0" normalizeH="0" baseline="0" noProof="0" dirty="0">
+                  <a:ln>
+                    <a:noFill/>
+                  </a:ln>
+                  <a:solidFill>
+                    <a:srgbClr val="404040"/>
+                  </a:solidFill>
+                  <a:effectLst/>
+                  <a:uLnTx/>
+                  <a:uFillTx/>
+                  <a:latin typeface="Arial" panose="020B0604020202020204" pitchFamily="34" charset="0"/>
+                  <a:ea typeface="等线" panose="02010600030101010101" pitchFamily="2" charset="-122"/>
+                  <a:cs typeface="Arial" panose="020B0604020202020204" pitchFamily="34" charset="0"/>
+                </a:rPr>
+                <a:t>Seat</a:t>
+              </a:r>
+              <a:endParaRPr kumimoji="0" lang="zh-CN" altLang="en-US" sz="1200" b="0" i="0" u="none" strike="noStrike" kern="1200" cap="none" spc="0" normalizeH="0" baseline="0" noProof="0" dirty="0">
+                <a:ln>
+                  <a:noFill/>
+                </a:ln>
+                <a:solidFill>
+                  <a:srgbClr val="404040"/>
+                </a:solidFill>
+                <a:effectLst/>
+                <a:uLnTx/>
+                <a:uFillTx/>
+                <a:latin typeface="Arial" panose="020B0604020202020204" pitchFamily="34" charset="0"/>
+                <a:ea typeface="等线" panose="02010600030101010101" pitchFamily="2" charset="-122"/>
+                <a:cs typeface="Arial" panose="020B0604020202020204" pitchFamily="34" charset="0"/>
+              </a:endParaRPr>
+            </a:p>
+          </p:txBody>
+        </p:sp>
+      </p:grpSp>
+    </p:spTree>
+    <p:extLst>
+      <p:ext uri="{BB962C8B-B14F-4D97-AF65-F5344CB8AC3E}">
+        <p14:creationId xmlns:p14="http://schemas.microsoft.com/office/powerpoint/2010/main" val="3970252923"/>
+      </p:ext>
+    </p:extLst>
+  </p:cSld>
+  <p:clrMapOvr>
+    <a:masterClrMapping/>
+  </p:clrMapOvr>
+</p:sld>
+</file>
+
 <file path=ppt/theme/theme1.xml><?xml version="1.0" encoding="utf-8"?>
 <a:theme xmlns:a="http://schemas.openxmlformats.org/drawingml/2006/main" name="Office 主题​​">
   <a:themeElements>

</xml_diff>

<commit_message>
#79 amend boarding pass background.
</commit_message>
<xml_diff>
--- a/kiosk/icons/reserve/seatIcons.pptx
+++ b/kiosk/icons/reserve/seatIcons.pptx
@@ -4065,10 +4065,10 @@
         </p:nvGrpSpPr>
         <p:grpSpPr>
           <a:xfrm>
-            <a:off x="704597" y="401992"/>
-            <a:ext cx="10412887" cy="2803862"/>
-            <a:chOff x="704597" y="401992"/>
-            <a:chExt cx="10412887" cy="2803862"/>
+            <a:off x="704597" y="389810"/>
+            <a:ext cx="10412887" cy="2816044"/>
+            <a:chOff x="704597" y="389810"/>
+            <a:chExt cx="10412887" cy="2816044"/>
           </a:xfrm>
         </p:grpSpPr>
         <p:grpSp>
@@ -4085,10 +4085,10 @@
           </p:nvGrpSpPr>
           <p:grpSpPr>
             <a:xfrm>
-              <a:off x="704597" y="401992"/>
-              <a:ext cx="10412887" cy="2803862"/>
-              <a:chOff x="704597" y="401992"/>
-              <a:chExt cx="10412887" cy="2803862"/>
+              <a:off x="704597" y="389810"/>
+              <a:ext cx="10412887" cy="2816044"/>
+              <a:chOff x="704597" y="389810"/>
+              <a:chExt cx="10412887" cy="2816044"/>
             </a:xfrm>
           </p:grpSpPr>
           <p:sp>
@@ -4228,7 +4228,7 @@
             </p:nvSpPr>
             <p:spPr>
               <a:xfrm>
-                <a:off x="1066379" y="401992"/>
+                <a:off x="1066379" y="389810"/>
                 <a:ext cx="1993803" cy="338554"/>
               </a:xfrm>
               <a:prstGeom prst="rect">
@@ -5850,10 +5850,10 @@
         </p:nvGrpSpPr>
         <p:grpSpPr>
           <a:xfrm>
-            <a:off x="704597" y="401992"/>
-            <a:ext cx="10412887" cy="2803862"/>
-            <a:chOff x="704597" y="401992"/>
-            <a:chExt cx="10412887" cy="2803862"/>
+            <a:off x="704597" y="389292"/>
+            <a:ext cx="10412887" cy="2816562"/>
+            <a:chOff x="704597" y="389292"/>
+            <a:chExt cx="10412887" cy="2816562"/>
           </a:xfrm>
         </p:grpSpPr>
         <p:grpSp>
@@ -5870,10 +5870,10 @@
           </p:nvGrpSpPr>
           <p:grpSpPr>
             <a:xfrm>
-              <a:off x="704597" y="401992"/>
-              <a:ext cx="10412887" cy="2803862"/>
-              <a:chOff x="704597" y="401992"/>
-              <a:chExt cx="10412887" cy="2803862"/>
+              <a:off x="704597" y="389292"/>
+              <a:ext cx="10412887" cy="2816562"/>
+              <a:chOff x="704597" y="389292"/>
+              <a:chExt cx="10412887" cy="2816562"/>
             </a:xfrm>
           </p:grpSpPr>
           <p:grpSp>
@@ -5890,10 +5890,10 @@
             </p:nvGrpSpPr>
             <p:grpSpPr>
               <a:xfrm>
-                <a:off x="704597" y="401992"/>
-                <a:ext cx="10412887" cy="2803862"/>
-                <a:chOff x="704597" y="401992"/>
-                <a:chExt cx="10412887" cy="2803862"/>
+                <a:off x="704597" y="389292"/>
+                <a:ext cx="10412887" cy="2816562"/>
+                <a:chOff x="704597" y="389292"/>
+                <a:chExt cx="10412887" cy="2816562"/>
               </a:xfrm>
             </p:grpSpPr>
             <p:sp>
@@ -6083,7 +6083,7 @@
               </p:nvSpPr>
               <p:spPr>
                 <a:xfrm>
-                  <a:off x="1066379" y="401992"/>
+                  <a:off x="1066379" y="389292"/>
                   <a:ext cx="1993803" cy="338554"/>
                 </a:xfrm>
                 <a:prstGeom prst="rect">

</xml_diff>

<commit_message>
#79 amend boarding pass background and improve BoardingPassCard layout.
</commit_message>
<xml_diff>
--- a/kiosk/icons/reserve/seatIcons.pptx
+++ b/kiosk/icons/reserve/seatIcons.pptx
@@ -261,7 +261,7 @@
           <a:p>
             <a:fld id="{C53F72F5-EC46-4A9F-BAA9-6D34191D1B77}" type="datetimeFigureOut">
               <a:rPr lang="zh-CN" altLang="en-US" smtClean="0"/>
-              <a:t>2022/5/19</a:t>
+              <a:t>2022/5/20</a:t>
             </a:fld>
             <a:endParaRPr lang="zh-CN" altLang="en-US"/>
           </a:p>
@@ -459,7 +459,7 @@
           <a:p>
             <a:fld id="{C53F72F5-EC46-4A9F-BAA9-6D34191D1B77}" type="datetimeFigureOut">
               <a:rPr lang="zh-CN" altLang="en-US" smtClean="0"/>
-              <a:t>2022/5/19</a:t>
+              <a:t>2022/5/20</a:t>
             </a:fld>
             <a:endParaRPr lang="zh-CN" altLang="en-US"/>
           </a:p>
@@ -667,7 +667,7 @@
           <a:p>
             <a:fld id="{C53F72F5-EC46-4A9F-BAA9-6D34191D1B77}" type="datetimeFigureOut">
               <a:rPr lang="zh-CN" altLang="en-US" smtClean="0"/>
-              <a:t>2022/5/19</a:t>
+              <a:t>2022/5/20</a:t>
             </a:fld>
             <a:endParaRPr lang="zh-CN" altLang="en-US"/>
           </a:p>
@@ -865,7 +865,7 @@
           <a:p>
             <a:fld id="{C53F72F5-EC46-4A9F-BAA9-6D34191D1B77}" type="datetimeFigureOut">
               <a:rPr lang="zh-CN" altLang="en-US" smtClean="0"/>
-              <a:t>2022/5/19</a:t>
+              <a:t>2022/5/20</a:t>
             </a:fld>
             <a:endParaRPr lang="zh-CN" altLang="en-US"/>
           </a:p>
@@ -1140,7 +1140,7 @@
           <a:p>
             <a:fld id="{C53F72F5-EC46-4A9F-BAA9-6D34191D1B77}" type="datetimeFigureOut">
               <a:rPr lang="zh-CN" altLang="en-US" smtClean="0"/>
-              <a:t>2022/5/19</a:t>
+              <a:t>2022/5/20</a:t>
             </a:fld>
             <a:endParaRPr lang="zh-CN" altLang="en-US"/>
           </a:p>
@@ -1405,7 +1405,7 @@
           <a:p>
             <a:fld id="{C53F72F5-EC46-4A9F-BAA9-6D34191D1B77}" type="datetimeFigureOut">
               <a:rPr lang="zh-CN" altLang="en-US" smtClean="0"/>
-              <a:t>2022/5/19</a:t>
+              <a:t>2022/5/20</a:t>
             </a:fld>
             <a:endParaRPr lang="zh-CN" altLang="en-US"/>
           </a:p>
@@ -1817,7 +1817,7 @@
           <a:p>
             <a:fld id="{C53F72F5-EC46-4A9F-BAA9-6D34191D1B77}" type="datetimeFigureOut">
               <a:rPr lang="zh-CN" altLang="en-US" smtClean="0"/>
-              <a:t>2022/5/19</a:t>
+              <a:t>2022/5/20</a:t>
             </a:fld>
             <a:endParaRPr lang="zh-CN" altLang="en-US"/>
           </a:p>
@@ -1958,7 +1958,7 @@
           <a:p>
             <a:fld id="{C53F72F5-EC46-4A9F-BAA9-6D34191D1B77}" type="datetimeFigureOut">
               <a:rPr lang="zh-CN" altLang="en-US" smtClean="0"/>
-              <a:t>2022/5/19</a:t>
+              <a:t>2022/5/20</a:t>
             </a:fld>
             <a:endParaRPr lang="zh-CN" altLang="en-US"/>
           </a:p>
@@ -2071,7 +2071,7 @@
           <a:p>
             <a:fld id="{C53F72F5-EC46-4A9F-BAA9-6D34191D1B77}" type="datetimeFigureOut">
               <a:rPr lang="zh-CN" altLang="en-US" smtClean="0"/>
-              <a:t>2022/5/19</a:t>
+              <a:t>2022/5/20</a:t>
             </a:fld>
             <a:endParaRPr lang="zh-CN" altLang="en-US"/>
           </a:p>
@@ -2382,7 +2382,7 @@
           <a:p>
             <a:fld id="{C53F72F5-EC46-4A9F-BAA9-6D34191D1B77}" type="datetimeFigureOut">
               <a:rPr lang="zh-CN" altLang="en-US" smtClean="0"/>
-              <a:t>2022/5/19</a:t>
+              <a:t>2022/5/20</a:t>
             </a:fld>
             <a:endParaRPr lang="zh-CN" altLang="en-US"/>
           </a:p>
@@ -2670,7 +2670,7 @@
           <a:p>
             <a:fld id="{C53F72F5-EC46-4A9F-BAA9-6D34191D1B77}" type="datetimeFigureOut">
               <a:rPr lang="zh-CN" altLang="en-US" smtClean="0"/>
-              <a:t>2022/5/19</a:t>
+              <a:t>2022/5/20</a:t>
             </a:fld>
             <a:endParaRPr lang="zh-CN" altLang="en-US"/>
           </a:p>
@@ -2911,7 +2911,7 @@
           <a:p>
             <a:fld id="{C53F72F5-EC46-4A9F-BAA9-6D34191D1B77}" type="datetimeFigureOut">
               <a:rPr lang="zh-CN" altLang="en-US" smtClean="0"/>
-              <a:t>2022/5/19</a:t>
+              <a:t>2022/5/20</a:t>
             </a:fld>
             <a:endParaRPr lang="zh-CN" altLang="en-US"/>
           </a:p>
@@ -5116,7 +5116,7 @@
         </p:nvSpPr>
         <p:spPr>
           <a:xfrm>
-            <a:off x="6872038" y="1263821"/>
+            <a:off x="6872038" y="1263505"/>
             <a:ext cx="1534402" cy="276999"/>
           </a:xfrm>
           <a:prstGeom prst="rect">
@@ -5164,7 +5164,7 @@
         </p:nvSpPr>
         <p:spPr>
           <a:xfrm>
-            <a:off x="6872038" y="1978923"/>
+            <a:off x="6872038" y="1999736"/>
             <a:ext cx="1534402" cy="276999"/>
           </a:xfrm>
           <a:prstGeom prst="rect">
@@ -6961,7 +6961,7 @@
           </p:nvSpPr>
           <p:spPr>
             <a:xfrm>
-              <a:off x="6872038" y="1978923"/>
+              <a:off x="6872038" y="2002237"/>
               <a:ext cx="1534402" cy="276999"/>
             </a:xfrm>
             <a:prstGeom prst="rect">

</xml_diff>

<commit_message>
Design icons for AboutSatisflight.
</commit_message>
<xml_diff>
--- a/kiosk/icons/reserve/seatIcons.pptx
+++ b/kiosk/icons/reserve/seatIcons.pptx
@@ -8,6 +8,7 @@
     <p:sldId id="256" r:id="rId2"/>
     <p:sldId id="257" r:id="rId3"/>
     <p:sldId id="258" r:id="rId4"/>
+    <p:sldId id="259" r:id="rId5"/>
   </p:sldIdLst>
   <p:sldSz cx="12192000" cy="6858000"/>
   <p:notesSz cx="6858000" cy="9144000"/>
@@ -261,7 +262,7 @@
           <a:p>
             <a:fld id="{C53F72F5-EC46-4A9F-BAA9-6D34191D1B77}" type="datetimeFigureOut">
               <a:rPr lang="zh-CN" altLang="en-US" smtClean="0"/>
-              <a:t>2022/5/20</a:t>
+              <a:t>2022/5/21</a:t>
             </a:fld>
             <a:endParaRPr lang="zh-CN" altLang="en-US"/>
           </a:p>
@@ -459,7 +460,7 @@
           <a:p>
             <a:fld id="{C53F72F5-EC46-4A9F-BAA9-6D34191D1B77}" type="datetimeFigureOut">
               <a:rPr lang="zh-CN" altLang="en-US" smtClean="0"/>
-              <a:t>2022/5/20</a:t>
+              <a:t>2022/5/21</a:t>
             </a:fld>
             <a:endParaRPr lang="zh-CN" altLang="en-US"/>
           </a:p>
@@ -667,7 +668,7 @@
           <a:p>
             <a:fld id="{C53F72F5-EC46-4A9F-BAA9-6D34191D1B77}" type="datetimeFigureOut">
               <a:rPr lang="zh-CN" altLang="en-US" smtClean="0"/>
-              <a:t>2022/5/20</a:t>
+              <a:t>2022/5/21</a:t>
             </a:fld>
             <a:endParaRPr lang="zh-CN" altLang="en-US"/>
           </a:p>
@@ -865,7 +866,7 @@
           <a:p>
             <a:fld id="{C53F72F5-EC46-4A9F-BAA9-6D34191D1B77}" type="datetimeFigureOut">
               <a:rPr lang="zh-CN" altLang="en-US" smtClean="0"/>
-              <a:t>2022/5/20</a:t>
+              <a:t>2022/5/21</a:t>
             </a:fld>
             <a:endParaRPr lang="zh-CN" altLang="en-US"/>
           </a:p>
@@ -1140,7 +1141,7 @@
           <a:p>
             <a:fld id="{C53F72F5-EC46-4A9F-BAA9-6D34191D1B77}" type="datetimeFigureOut">
               <a:rPr lang="zh-CN" altLang="en-US" smtClean="0"/>
-              <a:t>2022/5/20</a:t>
+              <a:t>2022/5/21</a:t>
             </a:fld>
             <a:endParaRPr lang="zh-CN" altLang="en-US"/>
           </a:p>
@@ -1405,7 +1406,7 @@
           <a:p>
             <a:fld id="{C53F72F5-EC46-4A9F-BAA9-6D34191D1B77}" type="datetimeFigureOut">
               <a:rPr lang="zh-CN" altLang="en-US" smtClean="0"/>
-              <a:t>2022/5/20</a:t>
+              <a:t>2022/5/21</a:t>
             </a:fld>
             <a:endParaRPr lang="zh-CN" altLang="en-US"/>
           </a:p>
@@ -1817,7 +1818,7 @@
           <a:p>
             <a:fld id="{C53F72F5-EC46-4A9F-BAA9-6D34191D1B77}" type="datetimeFigureOut">
               <a:rPr lang="zh-CN" altLang="en-US" smtClean="0"/>
-              <a:t>2022/5/20</a:t>
+              <a:t>2022/5/21</a:t>
             </a:fld>
             <a:endParaRPr lang="zh-CN" altLang="en-US"/>
           </a:p>
@@ -1958,7 +1959,7 @@
           <a:p>
             <a:fld id="{C53F72F5-EC46-4A9F-BAA9-6D34191D1B77}" type="datetimeFigureOut">
               <a:rPr lang="zh-CN" altLang="en-US" smtClean="0"/>
-              <a:t>2022/5/20</a:t>
+              <a:t>2022/5/21</a:t>
             </a:fld>
             <a:endParaRPr lang="zh-CN" altLang="en-US"/>
           </a:p>
@@ -2071,7 +2072,7 @@
           <a:p>
             <a:fld id="{C53F72F5-EC46-4A9F-BAA9-6D34191D1B77}" type="datetimeFigureOut">
               <a:rPr lang="zh-CN" altLang="en-US" smtClean="0"/>
-              <a:t>2022/5/20</a:t>
+              <a:t>2022/5/21</a:t>
             </a:fld>
             <a:endParaRPr lang="zh-CN" altLang="en-US"/>
           </a:p>
@@ -2382,7 +2383,7 @@
           <a:p>
             <a:fld id="{C53F72F5-EC46-4A9F-BAA9-6D34191D1B77}" type="datetimeFigureOut">
               <a:rPr lang="zh-CN" altLang="en-US" smtClean="0"/>
-              <a:t>2022/5/20</a:t>
+              <a:t>2022/5/21</a:t>
             </a:fld>
             <a:endParaRPr lang="zh-CN" altLang="en-US"/>
           </a:p>
@@ -2670,7 +2671,7 @@
           <a:p>
             <a:fld id="{C53F72F5-EC46-4A9F-BAA9-6D34191D1B77}" type="datetimeFigureOut">
               <a:rPr lang="zh-CN" altLang="en-US" smtClean="0"/>
-              <a:t>2022/5/20</a:t>
+              <a:t>2022/5/21</a:t>
             </a:fld>
             <a:endParaRPr lang="zh-CN" altLang="en-US"/>
           </a:p>
@@ -2911,7 +2912,7 @@
           <a:p>
             <a:fld id="{C53F72F5-EC46-4A9F-BAA9-6D34191D1B77}" type="datetimeFigureOut">
               <a:rPr lang="zh-CN" altLang="en-US" smtClean="0"/>
-              <a:t>2022/5/20</a:t>
+              <a:t>2022/5/21</a:t>
             </a:fld>
             <a:endParaRPr lang="zh-CN" altLang="en-US"/>
           </a:p>
@@ -7435,6 +7436,234 @@
 </p:sld>
 </file>
 
+<file path=ppt/slides/slide4.xml><?xml version="1.0" encoding="utf-8"?>
+<p:sld xmlns:a="http://schemas.openxmlformats.org/drawingml/2006/main" xmlns:r="http://schemas.openxmlformats.org/officeDocument/2006/relationships" xmlns:p="http://schemas.openxmlformats.org/presentationml/2006/main">
+  <p:cSld>
+    <p:spTree>
+      <p:nvGrpSpPr>
+        <p:cNvPr id="1" name=""/>
+        <p:cNvGrpSpPr/>
+        <p:nvPr/>
+      </p:nvGrpSpPr>
+      <p:grpSpPr>
+        <a:xfrm>
+          <a:off x="0" y="0"/>
+          <a:ext cx="0" cy="0"/>
+          <a:chOff x="0" y="0"/>
+          <a:chExt cx="0" cy="0"/>
+        </a:xfrm>
+      </p:grpSpPr>
+      <p:sp>
+        <p:nvSpPr>
+          <p:cNvPr id="4" name="椭圆 3">
+            <a:extLst>
+              <a:ext uri="{FF2B5EF4-FFF2-40B4-BE49-F238E27FC236}">
+                <a16:creationId xmlns:a16="http://schemas.microsoft.com/office/drawing/2014/main" id="{6A4DEDC1-7D6E-246A-923D-971FFD004CAA}"/>
+              </a:ext>
+            </a:extLst>
+          </p:cNvPr>
+          <p:cNvSpPr/>
+          <p:nvPr/>
+        </p:nvSpPr>
+        <p:spPr>
+          <a:xfrm>
+            <a:off x="2753032" y="2871019"/>
+            <a:ext cx="1199536" cy="1199536"/>
+          </a:xfrm>
+          <a:prstGeom prst="ellipse">
+            <a:avLst/>
+          </a:prstGeom>
+          <a:solidFill>
+            <a:srgbClr val="F96351"/>
+          </a:solidFill>
+          <a:ln>
+            <a:noFill/>
+          </a:ln>
+        </p:spPr>
+        <p:style>
+          <a:lnRef idx="2">
+            <a:schemeClr val="accent1">
+              <a:shade val="50000"/>
+            </a:schemeClr>
+          </a:lnRef>
+          <a:fillRef idx="1">
+            <a:schemeClr val="accent1"/>
+          </a:fillRef>
+          <a:effectRef idx="0">
+            <a:schemeClr val="accent1"/>
+          </a:effectRef>
+          <a:fontRef idx="minor">
+            <a:schemeClr val="lt1"/>
+          </a:fontRef>
+        </p:style>
+        <p:txBody>
+          <a:bodyPr rtlCol="0" anchor="ctr"/>
+          <a:lstStyle/>
+          <a:p>
+            <a:pPr algn="ctr"/>
+            <a:endParaRPr lang="zh-CN" altLang="en-US" dirty="0"/>
+          </a:p>
+        </p:txBody>
+      </p:sp>
+      <p:sp>
+        <p:nvSpPr>
+          <p:cNvPr id="5" name="椭圆 4">
+            <a:extLst>
+              <a:ext uri="{FF2B5EF4-FFF2-40B4-BE49-F238E27FC236}">
+                <a16:creationId xmlns:a16="http://schemas.microsoft.com/office/drawing/2014/main" id="{BAA93A93-5C90-497E-8162-B10E862514FA}"/>
+              </a:ext>
+            </a:extLst>
+          </p:cNvPr>
+          <p:cNvSpPr/>
+          <p:nvPr/>
+        </p:nvSpPr>
+        <p:spPr>
+          <a:xfrm>
+            <a:off x="4390103" y="2871019"/>
+            <a:ext cx="1199536" cy="1199536"/>
+          </a:xfrm>
+          <a:prstGeom prst="ellipse">
+            <a:avLst/>
+          </a:prstGeom>
+          <a:solidFill>
+            <a:srgbClr val="F96351"/>
+          </a:solidFill>
+          <a:ln>
+            <a:noFill/>
+          </a:ln>
+        </p:spPr>
+        <p:style>
+          <a:lnRef idx="2">
+            <a:schemeClr val="accent1">
+              <a:shade val="50000"/>
+            </a:schemeClr>
+          </a:lnRef>
+          <a:fillRef idx="1">
+            <a:schemeClr val="accent1"/>
+          </a:fillRef>
+          <a:effectRef idx="0">
+            <a:schemeClr val="accent1"/>
+          </a:effectRef>
+          <a:fontRef idx="minor">
+            <a:schemeClr val="lt1"/>
+          </a:fontRef>
+        </p:style>
+        <p:txBody>
+          <a:bodyPr rtlCol="0" anchor="ctr"/>
+          <a:lstStyle/>
+          <a:p>
+            <a:pPr algn="ctr">
+              <a:lnSpc>
+                <a:spcPts val="10700"/>
+              </a:lnSpc>
+            </a:pPr>
+            <a:r>
+              <a:rPr lang="en-US" altLang="zh-CN" sz="9600" b="1" i="0" dirty="0">
+                <a:solidFill>
+                  <a:srgbClr val="6B0C09"/>
+                </a:solidFill>
+                <a:effectLst/>
+                <a:latin typeface="Arial" panose="020B0604020202020204" pitchFamily="34" charset="0"/>
+                <a:cs typeface="Arial" panose="020B0604020202020204" pitchFamily="34" charset="0"/>
+              </a:rPr>
+              <a:t>×</a:t>
+            </a:r>
+            <a:endParaRPr lang="zh-CN" altLang="en-US" sz="9600" b="1" dirty="0">
+              <a:solidFill>
+                <a:srgbClr val="6B0C09"/>
+              </a:solidFill>
+              <a:latin typeface="Arial" panose="020B0604020202020204" pitchFamily="34" charset="0"/>
+              <a:cs typeface="Arial" panose="020B0604020202020204" pitchFamily="34" charset="0"/>
+            </a:endParaRPr>
+          </a:p>
+        </p:txBody>
+      </p:sp>
+      <p:sp>
+        <p:nvSpPr>
+          <p:cNvPr id="8" name="椭圆 7">
+            <a:extLst>
+              <a:ext uri="{FF2B5EF4-FFF2-40B4-BE49-F238E27FC236}">
+                <a16:creationId xmlns:a16="http://schemas.microsoft.com/office/drawing/2014/main" id="{2D9BA9C8-61DA-E678-239F-294B6411167C}"/>
+              </a:ext>
+            </a:extLst>
+          </p:cNvPr>
+          <p:cNvSpPr/>
+          <p:nvPr/>
+        </p:nvSpPr>
+        <p:spPr>
+          <a:xfrm>
+            <a:off x="6027174" y="2871019"/>
+            <a:ext cx="1199536" cy="1199536"/>
+          </a:xfrm>
+          <a:prstGeom prst="ellipse">
+            <a:avLst/>
+          </a:prstGeom>
+          <a:solidFill>
+            <a:srgbClr val="F72711"/>
+          </a:solidFill>
+          <a:ln>
+            <a:noFill/>
+          </a:ln>
+        </p:spPr>
+        <p:style>
+          <a:lnRef idx="2">
+            <a:schemeClr val="accent1">
+              <a:shade val="50000"/>
+            </a:schemeClr>
+          </a:lnRef>
+          <a:fillRef idx="1">
+            <a:schemeClr val="accent1"/>
+          </a:fillRef>
+          <a:effectRef idx="0">
+            <a:schemeClr val="accent1"/>
+          </a:effectRef>
+          <a:fontRef idx="minor">
+            <a:schemeClr val="lt1"/>
+          </a:fontRef>
+        </p:style>
+        <p:txBody>
+          <a:bodyPr rtlCol="0" anchor="ctr"/>
+          <a:lstStyle/>
+          <a:p>
+            <a:pPr algn="ctr">
+              <a:lnSpc>
+                <a:spcPts val="10700"/>
+              </a:lnSpc>
+            </a:pPr>
+            <a:r>
+              <a:rPr lang="en-US" altLang="zh-CN" sz="9600" b="1" i="0" dirty="0">
+                <a:solidFill>
+                  <a:srgbClr val="3D0605"/>
+                </a:solidFill>
+                <a:effectLst/>
+                <a:latin typeface="Arial" panose="020B0604020202020204" pitchFamily="34" charset="0"/>
+                <a:cs typeface="Arial" panose="020B0604020202020204" pitchFamily="34" charset="0"/>
+              </a:rPr>
+              <a:t>×</a:t>
+            </a:r>
+            <a:endParaRPr lang="zh-CN" altLang="en-US" sz="9600" b="1" dirty="0">
+              <a:solidFill>
+                <a:srgbClr val="3D0605"/>
+              </a:solidFill>
+              <a:latin typeface="Arial" panose="020B0604020202020204" pitchFamily="34" charset="0"/>
+              <a:cs typeface="Arial" panose="020B0604020202020204" pitchFamily="34" charset="0"/>
+            </a:endParaRPr>
+          </a:p>
+        </p:txBody>
+      </p:sp>
+    </p:spTree>
+    <p:extLst>
+      <p:ext uri="{BB962C8B-B14F-4D97-AF65-F5344CB8AC3E}">
+        <p14:creationId xmlns:p14="http://schemas.microsoft.com/office/powerpoint/2010/main" val="1128698812"/>
+      </p:ext>
+    </p:extLst>
+  </p:cSld>
+  <p:clrMapOvr>
+    <a:masterClrMapping/>
+  </p:clrMapOvr>
+</p:sld>
+</file>
+
 <file path=ppt/theme/theme1.xml><?xml version="1.0" encoding="utf-8"?>
 <a:theme xmlns:a="http://schemas.openxmlformats.org/drawingml/2006/main" name="Office 主题​​">
   <a:themeElements>

</xml_diff>